<commit_message>
slides for interim, updated
</commit_message>
<xml_diff>
--- a/122/NETCONF/netconf-nmop-interim-draft-netana-netconf-yp-transport-capabilities-01.pptx
+++ b/122/NETCONF/netconf-nmop-interim-draft-netana-netconf-yp-transport-capabilities-01.pptx
@@ -5,17 +5,18 @@
     <p:sldMasterId id="2147483648" r:id="rId1"/>
   </p:sldMasterIdLst>
   <p:notesMasterIdLst>
-    <p:notesMasterId r:id="rId10"/>
+    <p:notesMasterId r:id="rId11"/>
   </p:notesMasterIdLst>
   <p:sldIdLst>
     <p:sldId id="1041" r:id="rId2"/>
-    <p:sldId id="2145706270" r:id="rId3"/>
-    <p:sldId id="2145706271" r:id="rId4"/>
-    <p:sldId id="2145706260" r:id="rId5"/>
-    <p:sldId id="2145706272" r:id="rId6"/>
-    <p:sldId id="273" r:id="rId7"/>
-    <p:sldId id="2145706256" r:id="rId8"/>
-    <p:sldId id="2145706269" r:id="rId9"/>
+    <p:sldId id="2145706267" r:id="rId3"/>
+    <p:sldId id="2145706270" r:id="rId4"/>
+    <p:sldId id="2145706271" r:id="rId5"/>
+    <p:sldId id="2145706260" r:id="rId6"/>
+    <p:sldId id="2145706272" r:id="rId7"/>
+    <p:sldId id="273" r:id="rId8"/>
+    <p:sldId id="2145706256" r:id="rId9"/>
+    <p:sldId id="2145706269" r:id="rId10"/>
   </p:sldIdLst>
   <p:sldSz cx="12192000" cy="6858000"/>
   <p:notesSz cx="6858000" cy="9144000"/>
@@ -125,7 +126,7 @@
 <file path=ppt/revisionInfo.xml><?xml version="1.0" encoding="utf-8"?>
 <p1510:revInfo xmlns:a="http://schemas.openxmlformats.org/drawingml/2006/main" xmlns:r="http://schemas.openxmlformats.org/officeDocument/2006/relationships" xmlns:p1510="http://schemas.microsoft.com/office/powerpoint/2015/10/main">
   <p1510:revLst>
-    <p1510:client id="{EAD148C6-EC0E-46B3-BC90-2D75E7936726}" v="27" dt="2025-02-02T09:03:28.779"/>
+    <p1510:client id="{EAD148C6-EC0E-46B3-BC90-2D75E7936726}" v="29" dt="2025-02-06T09:58:17.040"/>
   </p1510:revLst>
 </p1510:revInfo>
 </file>
@@ -536,7 +537,7 @@
   <pc:docChgLst>
     <pc:chgData name="Graf Thomas, INI-NET-VNC-E2E" userId="487bc3e3-9ce7-4cdd-b7b4-8899ea88d289" providerId="ADAL" clId="{EAD148C6-EC0E-46B3-BC90-2D75E7936726}"/>
     <pc:docChg chg="undo redo custSel addSld modSld sldOrd">
-      <pc:chgData name="Graf Thomas, INI-NET-VNC-E2E" userId="487bc3e3-9ce7-4cdd-b7b4-8899ea88d289" providerId="ADAL" clId="{EAD148C6-EC0E-46B3-BC90-2D75E7936726}" dt="2025-02-02T09:05:35.526" v="3105" actId="20577"/>
+      <pc:chgData name="Graf Thomas, INI-NET-VNC-E2E" userId="487bc3e3-9ce7-4cdd-b7b4-8899ea88d289" providerId="ADAL" clId="{EAD148C6-EC0E-46B3-BC90-2D75E7936726}" dt="2025-02-06T10:01:25.583" v="3201" actId="20577"/>
       <pc:docMkLst>
         <pc:docMk/>
       </pc:docMkLst>
@@ -548,13 +549,13 @@
         </pc:sldMkLst>
       </pc:sldChg>
       <pc:sldChg chg="modSp mod">
-        <pc:chgData name="Graf Thomas, INI-NET-VNC-E2E" userId="487bc3e3-9ce7-4cdd-b7b4-8899ea88d289" providerId="ADAL" clId="{EAD148C6-EC0E-46B3-BC90-2D75E7936726}" dt="2025-02-02T08:16:23.725" v="1865" actId="20577"/>
+        <pc:chgData name="Graf Thomas, INI-NET-VNC-E2E" userId="487bc3e3-9ce7-4cdd-b7b4-8899ea88d289" providerId="ADAL" clId="{EAD148C6-EC0E-46B3-BC90-2D75E7936726}" dt="2025-02-06T10:01:10.053" v="3198" actId="20577"/>
         <pc:sldMkLst>
           <pc:docMk/>
           <pc:sldMk cId="3578665336" sldId="1041"/>
         </pc:sldMkLst>
         <pc:spChg chg="mod">
-          <ac:chgData name="Graf Thomas, INI-NET-VNC-E2E" userId="487bc3e3-9ce7-4cdd-b7b4-8899ea88d289" providerId="ADAL" clId="{EAD148C6-EC0E-46B3-BC90-2D75E7936726}" dt="2025-02-02T08:16:23.725" v="1865" actId="20577"/>
+          <ac:chgData name="Graf Thomas, INI-NET-VNC-E2E" userId="487bc3e3-9ce7-4cdd-b7b4-8899ea88d289" providerId="ADAL" clId="{EAD148C6-EC0E-46B3-BC90-2D75E7936726}" dt="2025-02-06T10:01:10.053" v="3198" actId="20577"/>
           <ac:spMkLst>
             <pc:docMk/>
             <pc:sldMk cId="3578665336" sldId="1041"/>
@@ -577,8 +578,8 @@
           <pc:sldMk cId="2701002203" sldId="2145706256"/>
         </pc:sldMkLst>
       </pc:sldChg>
-      <pc:sldChg chg="addSp modSp mod">
-        <pc:chgData name="Graf Thomas, INI-NET-VNC-E2E" userId="487bc3e3-9ce7-4cdd-b7b4-8899ea88d289" providerId="ADAL" clId="{EAD148C6-EC0E-46B3-BC90-2D75E7936726}" dt="2025-02-02T09:04:54.821" v="3093" actId="113"/>
+      <pc:sldChg chg="addSp delSp modSp mod">
+        <pc:chgData name="Graf Thomas, INI-NET-VNC-E2E" userId="487bc3e3-9ce7-4cdd-b7b4-8899ea88d289" providerId="ADAL" clId="{EAD148C6-EC0E-46B3-BC90-2D75E7936726}" dt="2025-02-06T10:01:19.569" v="3199" actId="478"/>
         <pc:sldMkLst>
           <pc:docMk/>
           <pc:sldMk cId="1767383836" sldId="2145706260"/>
@@ -599,8 +600,8 @@
             <ac:spMk id="3" creationId="{29C0DFD4-432D-4B0C-93DF-790441DCF5B9}"/>
           </ac:spMkLst>
         </pc:spChg>
-        <pc:spChg chg="mod">
-          <ac:chgData name="Graf Thomas, INI-NET-VNC-E2E" userId="487bc3e3-9ce7-4cdd-b7b4-8899ea88d289" providerId="ADAL" clId="{EAD148C6-EC0E-46B3-BC90-2D75E7936726}" dt="2025-02-02T08:06:24.066" v="1576" actId="20577"/>
+        <pc:spChg chg="del mod">
+          <ac:chgData name="Graf Thomas, INI-NET-VNC-E2E" userId="487bc3e3-9ce7-4cdd-b7b4-8899ea88d289" providerId="ADAL" clId="{EAD148C6-EC0E-46B3-BC90-2D75E7936726}" dt="2025-02-06T10:01:19.569" v="3199" actId="478"/>
           <ac:spMkLst>
             <pc:docMk/>
             <pc:sldMk cId="1767383836" sldId="2145706260"/>
@@ -616,6 +617,21 @@
           </ac:spMkLst>
         </pc:spChg>
       </pc:sldChg>
+      <pc:sldChg chg="modSp add mod">
+        <pc:chgData name="Graf Thomas, INI-NET-VNC-E2E" userId="487bc3e3-9ce7-4cdd-b7b4-8899ea88d289" providerId="ADAL" clId="{EAD148C6-EC0E-46B3-BC90-2D75E7936726}" dt="2025-02-06T10:01:00.899" v="3197" actId="20577"/>
+        <pc:sldMkLst>
+          <pc:docMk/>
+          <pc:sldMk cId="461661054" sldId="2145706267"/>
+        </pc:sldMkLst>
+        <pc:spChg chg="mod">
+          <ac:chgData name="Graf Thomas, INI-NET-VNC-E2E" userId="487bc3e3-9ce7-4cdd-b7b4-8899ea88d289" providerId="ADAL" clId="{EAD148C6-EC0E-46B3-BC90-2D75E7936726}" dt="2025-02-06T10:01:00.899" v="3197" actId="20577"/>
+          <ac:spMkLst>
+            <pc:docMk/>
+            <pc:sldMk cId="461661054" sldId="2145706267"/>
+            <ac:spMk id="5" creationId="{C26208B2-0D10-4C23-B2DE-372A62E98644}"/>
+          </ac:spMkLst>
+        </pc:spChg>
+      </pc:sldChg>
       <pc:sldChg chg="ord">
         <pc:chgData name="Graf Thomas, INI-NET-VNC-E2E" userId="487bc3e3-9ce7-4cdd-b7b4-8899ea88d289" providerId="ADAL" clId="{EAD148C6-EC0E-46B3-BC90-2D75E7936726}" dt="2025-02-02T08:16:42.685" v="1867"/>
         <pc:sldMkLst>
@@ -623,8 +639,8 @@
           <pc:sldMk cId="3562000331" sldId="2145706269"/>
         </pc:sldMkLst>
       </pc:sldChg>
-      <pc:sldChg chg="modSp mod">
-        <pc:chgData name="Graf Thomas, INI-NET-VNC-E2E" userId="487bc3e3-9ce7-4cdd-b7b4-8899ea88d289" providerId="ADAL" clId="{EAD148C6-EC0E-46B3-BC90-2D75E7936726}" dt="2025-02-02T08:18:08.495" v="1871" actId="20577"/>
+      <pc:sldChg chg="addSp delSp modSp mod">
+        <pc:chgData name="Graf Thomas, INI-NET-VNC-E2E" userId="487bc3e3-9ce7-4cdd-b7b4-8899ea88d289" providerId="ADAL" clId="{EAD148C6-EC0E-46B3-BC90-2D75E7936726}" dt="2025-02-06T09:58:30.664" v="3112" actId="1076"/>
         <pc:sldMkLst>
           <pc:docMk/>
           <pc:sldMk cId="2732367690" sldId="2145706270"/>
@@ -637,6 +653,22 @@
             <ac:spMk id="3" creationId="{29C0DFD4-432D-4B0C-93DF-790441DCF5B9}"/>
           </ac:spMkLst>
         </pc:spChg>
+        <pc:picChg chg="del">
+          <ac:chgData name="Graf Thomas, INI-NET-VNC-E2E" userId="487bc3e3-9ce7-4cdd-b7b4-8899ea88d289" providerId="ADAL" clId="{EAD148C6-EC0E-46B3-BC90-2D75E7936726}" dt="2025-02-06T09:58:21.168" v="3109" actId="478"/>
+          <ac:picMkLst>
+            <pc:docMk/>
+            <pc:sldMk cId="2732367690" sldId="2145706270"/>
+            <ac:picMk id="4" creationId="{AE8BF390-E5E9-1AC1-670D-320B2E27DC97}"/>
+          </ac:picMkLst>
+        </pc:picChg>
+        <pc:picChg chg="add mod ord">
+          <ac:chgData name="Graf Thomas, INI-NET-VNC-E2E" userId="487bc3e3-9ce7-4cdd-b7b4-8899ea88d289" providerId="ADAL" clId="{EAD148C6-EC0E-46B3-BC90-2D75E7936726}" dt="2025-02-06T09:58:30.664" v="3112" actId="1076"/>
+          <ac:picMkLst>
+            <pc:docMk/>
+            <pc:sldMk cId="2732367690" sldId="2145706270"/>
+            <ac:picMk id="5" creationId="{265163D7-4D63-1C0D-459F-0D85658F70CA}"/>
+          </ac:picMkLst>
+        </pc:picChg>
       </pc:sldChg>
       <pc:sldChg chg="addSp delSp modSp add mod">
         <pc:chgData name="Graf Thomas, INI-NET-VNC-E2E" userId="487bc3e3-9ce7-4cdd-b7b4-8899ea88d289" providerId="ADAL" clId="{EAD148C6-EC0E-46B3-BC90-2D75E7936726}" dt="2025-02-02T08:34:38.205" v="2332" actId="692"/>
@@ -710,7 +742,7 @@
         </pc:cxnChg>
       </pc:sldChg>
       <pc:sldChg chg="modSp add mod">
-        <pc:chgData name="Graf Thomas, INI-NET-VNC-E2E" userId="487bc3e3-9ce7-4cdd-b7b4-8899ea88d289" providerId="ADAL" clId="{EAD148C6-EC0E-46B3-BC90-2D75E7936726}" dt="2025-02-02T09:05:35.526" v="3105" actId="20577"/>
+        <pc:chgData name="Graf Thomas, INI-NET-VNC-E2E" userId="487bc3e3-9ce7-4cdd-b7b4-8899ea88d289" providerId="ADAL" clId="{EAD148C6-EC0E-46B3-BC90-2D75E7936726}" dt="2025-02-06T10:01:25.583" v="3201" actId="20577"/>
         <pc:sldMkLst>
           <pc:docMk/>
           <pc:sldMk cId="2671746310" sldId="2145706272"/>
@@ -729,6 +761,14 @@
             <pc:docMk/>
             <pc:sldMk cId="2671746310" sldId="2145706272"/>
             <ac:spMk id="3" creationId="{29C0DFD4-432D-4B0C-93DF-790441DCF5B9}"/>
+          </ac:spMkLst>
+        </pc:spChg>
+        <pc:spChg chg="mod">
+          <ac:chgData name="Graf Thomas, INI-NET-VNC-E2E" userId="487bc3e3-9ce7-4cdd-b7b4-8899ea88d289" providerId="ADAL" clId="{EAD148C6-EC0E-46B3-BC90-2D75E7936726}" dt="2025-02-06T10:01:25.583" v="3201" actId="20577"/>
+          <ac:spMkLst>
+            <pc:docMk/>
+            <pc:sldMk cId="2671746310" sldId="2145706272"/>
+            <ac:spMk id="4" creationId="{15F8C987-861D-7CFE-2544-77166341489C}"/>
           </ac:spMkLst>
         </pc:spChg>
       </pc:sldChg>
@@ -1082,7 +1122,7 @@
           <a:p>
             <a:fld id="{E5E705E9-673F-4AC4-B29E-A7B26F3B8523}" type="datetimeFigureOut">
               <a:rPr lang="de-CH" smtClean="0"/>
-              <a:t>02.02.2025</a:t>
+              <a:t>06.02.2025</a:t>
             </a:fld>
             <a:endParaRPr lang="de-CH"/>
           </a:p>
@@ -1415,7 +1455,7 @@
           <a:p>
             <a:fld id="{2BBC52A0-2F3F-497F-8536-39D60282E9C2}" type="slidenum">
               <a:rPr lang="de-CH" smtClean="0"/>
-              <a:t>2</a:t>
+              <a:t>3</a:t>
             </a:fld>
             <a:endParaRPr lang="de-CH"/>
           </a:p>
@@ -1499,7 +1539,7 @@
           <a:p>
             <a:fld id="{2BBC52A0-2F3F-497F-8536-39D60282E9C2}" type="slidenum">
               <a:rPr lang="de-CH" smtClean="0"/>
-              <a:t>3</a:t>
+              <a:t>4</a:t>
             </a:fld>
             <a:endParaRPr lang="de-CH"/>
           </a:p>
@@ -1583,7 +1623,7 @@
           <a:p>
             <a:fld id="{2BBC52A0-2F3F-497F-8536-39D60282E9C2}" type="slidenum">
               <a:rPr lang="de-CH" smtClean="0"/>
-              <a:t>4</a:t>
+              <a:t>5</a:t>
             </a:fld>
             <a:endParaRPr lang="de-CH"/>
           </a:p>
@@ -1667,7 +1707,7 @@
           <a:p>
             <a:fld id="{2BBC52A0-2F3F-497F-8536-39D60282E9C2}" type="slidenum">
               <a:rPr lang="de-CH" smtClean="0"/>
-              <a:t>5</a:t>
+              <a:t>6</a:t>
             </a:fld>
             <a:endParaRPr lang="de-CH"/>
           </a:p>
@@ -1823,7 +1863,7 @@
             </a:pPr>
             <a:fld id="{00000000-1234-1234-1234-123412341234}" type="slidenum">
               <a:rPr lang="de-CH"/>
-              <a:t>6</a:t>
+              <a:t>7</a:t>
             </a:fld>
             <a:endParaRPr/>
           </a:p>
@@ -1986,7 +2026,7 @@
           <a:p>
             <a:fld id="{9E9B238C-2335-4007-98C9-471C02CC43B6}" type="datetimeFigureOut">
               <a:rPr lang="de-CH" smtClean="0"/>
-              <a:t>02.02.2025</a:t>
+              <a:t>06.02.2025</a:t>
             </a:fld>
             <a:endParaRPr lang="de-CH"/>
           </a:p>
@@ -2186,7 +2226,7 @@
           <a:p>
             <a:fld id="{9E9B238C-2335-4007-98C9-471C02CC43B6}" type="datetimeFigureOut">
               <a:rPr lang="de-CH" smtClean="0"/>
-              <a:t>02.02.2025</a:t>
+              <a:t>06.02.2025</a:t>
             </a:fld>
             <a:endParaRPr lang="de-CH"/>
           </a:p>
@@ -2396,7 +2436,7 @@
           <a:p>
             <a:fld id="{9E9B238C-2335-4007-98C9-471C02CC43B6}" type="datetimeFigureOut">
               <a:rPr lang="de-CH" smtClean="0"/>
-              <a:t>02.02.2025</a:t>
+              <a:t>06.02.2025</a:t>
             </a:fld>
             <a:endParaRPr lang="de-CH"/>
           </a:p>
@@ -2596,7 +2636,7 @@
           <a:p>
             <a:fld id="{9E9B238C-2335-4007-98C9-471C02CC43B6}" type="datetimeFigureOut">
               <a:rPr lang="de-CH" smtClean="0"/>
-              <a:t>02.02.2025</a:t>
+              <a:t>06.02.2025</a:t>
             </a:fld>
             <a:endParaRPr lang="de-CH"/>
           </a:p>
@@ -2872,7 +2912,7 @@
           <a:p>
             <a:fld id="{9E9B238C-2335-4007-98C9-471C02CC43B6}" type="datetimeFigureOut">
               <a:rPr lang="de-CH" smtClean="0"/>
-              <a:t>02.02.2025</a:t>
+              <a:t>06.02.2025</a:t>
             </a:fld>
             <a:endParaRPr lang="de-CH"/>
           </a:p>
@@ -3140,7 +3180,7 @@
           <a:p>
             <a:fld id="{9E9B238C-2335-4007-98C9-471C02CC43B6}" type="datetimeFigureOut">
               <a:rPr lang="de-CH" smtClean="0"/>
-              <a:t>02.02.2025</a:t>
+              <a:t>06.02.2025</a:t>
             </a:fld>
             <a:endParaRPr lang="de-CH"/>
           </a:p>
@@ -3555,7 +3595,7 @@
           <a:p>
             <a:fld id="{9E9B238C-2335-4007-98C9-471C02CC43B6}" type="datetimeFigureOut">
               <a:rPr lang="de-CH" smtClean="0"/>
-              <a:t>02.02.2025</a:t>
+              <a:t>06.02.2025</a:t>
             </a:fld>
             <a:endParaRPr lang="de-CH"/>
           </a:p>
@@ -3697,7 +3737,7 @@
           <a:p>
             <a:fld id="{9E9B238C-2335-4007-98C9-471C02CC43B6}" type="datetimeFigureOut">
               <a:rPr lang="de-CH" smtClean="0"/>
-              <a:t>02.02.2025</a:t>
+              <a:t>06.02.2025</a:t>
             </a:fld>
             <a:endParaRPr lang="de-CH"/>
           </a:p>
@@ -3810,7 +3850,7 @@
           <a:p>
             <a:fld id="{9E9B238C-2335-4007-98C9-471C02CC43B6}" type="datetimeFigureOut">
               <a:rPr lang="de-CH" smtClean="0"/>
-              <a:t>02.02.2025</a:t>
+              <a:t>06.02.2025</a:t>
             </a:fld>
             <a:endParaRPr lang="de-CH"/>
           </a:p>
@@ -4123,7 +4163,7 @@
           <a:p>
             <a:fld id="{9E9B238C-2335-4007-98C9-471C02CC43B6}" type="datetimeFigureOut">
               <a:rPr lang="de-CH" smtClean="0"/>
-              <a:t>02.02.2025</a:t>
+              <a:t>06.02.2025</a:t>
             </a:fld>
             <a:endParaRPr lang="de-CH"/>
           </a:p>
@@ -4412,7 +4452,7 @@
           <a:p>
             <a:fld id="{9E9B238C-2335-4007-98C9-471C02CC43B6}" type="datetimeFigureOut">
               <a:rPr lang="de-CH" smtClean="0"/>
-              <a:t>02.02.2025</a:t>
+              <a:t>06.02.2025</a:t>
             </a:fld>
             <a:endParaRPr lang="de-CH"/>
           </a:p>
@@ -4655,7 +4695,7 @@
           <a:p>
             <a:fld id="{9E9B238C-2335-4007-98C9-471C02CC43B6}" type="datetimeFigureOut">
               <a:rPr lang="de-CH" smtClean="0"/>
-              <a:t>02.02.2025</a:t>
+              <a:t>06.02.2025</a:t>
             </a:fld>
             <a:endParaRPr lang="de-CH"/>
           </a:p>
@@ -5762,7 +5802,7 @@
               <a:rPr lang="de-CH" sz="3800" dirty="0">
                 <a:latin typeface="+mj-lt"/>
               </a:rPr>
-              <a:t>2. </a:t>
+              <a:t>6. </a:t>
             </a:r>
             <a:r>
               <a:rPr lang="de-CH" sz="3800" dirty="0" err="1">
@@ -5822,6 +5862,216 @@
       </p:grpSpPr>
       <p:sp>
         <p:nvSpPr>
+          <p:cNvPr id="5" name="Titel 1">
+            <a:extLst>
+              <a:ext uri="{FF2B5EF4-FFF2-40B4-BE49-F238E27FC236}">
+                <a16:creationId xmlns:a16="http://schemas.microsoft.com/office/drawing/2014/main" id="{C26208B2-0D10-4C23-B2DE-372A62E98644}"/>
+              </a:ext>
+            </a:extLst>
+          </p:cNvPr>
+          <p:cNvSpPr txBox="1">
+            <a:spLocks/>
+          </p:cNvSpPr>
+          <p:nvPr/>
+        </p:nvSpPr>
+        <p:spPr>
+          <a:xfrm>
+            <a:off x="606830" y="1365772"/>
+            <a:ext cx="11395314" cy="3239002"/>
+          </a:xfrm>
+          <a:prstGeom prst="rect">
+            <a:avLst/>
+          </a:prstGeom>
+        </p:spPr>
+        <p:txBody>
+          <a:bodyPr vert="horz" lIns="91440" tIns="45720" rIns="91440" bIns="45720" rtlCol="0" anchor="ctr">
+            <a:normAutofit fontScale="92500" lnSpcReduction="10000"/>
+          </a:bodyPr>
+          <a:lstStyle>
+            <a:lvl1pPr algn="l" defTabSz="914400" rtl="0" eaLnBrk="1" latinLnBrk="0" hangingPunct="1">
+              <a:lnSpc>
+                <a:spcPct val="90000"/>
+              </a:lnSpc>
+              <a:spcBef>
+                <a:spcPct val="0"/>
+              </a:spcBef>
+              <a:buNone/>
+              <a:defRPr sz="4400" kern="1200">
+                <a:solidFill>
+                  <a:schemeClr val="tx1"/>
+                </a:solidFill>
+                <a:latin typeface="+mj-lt"/>
+                <a:ea typeface="+mj-ea"/>
+                <a:cs typeface="+mj-cs"/>
+              </a:defRPr>
+            </a:lvl1pPr>
+          </a:lstStyle>
+          <a:p>
+            <a:r>
+              <a:rPr lang="en-US" sz="3400" b="1" dirty="0"/>
+              <a:t>Agenda Items</a:t>
+            </a:r>
+          </a:p>
+          <a:p>
+            <a:endParaRPr lang="en-US" sz="3400" b="1" dirty="0"/>
+          </a:p>
+          <a:p>
+            <a:pPr marL="457200" indent="-457200">
+              <a:spcBef>
+                <a:spcPts val="1200"/>
+              </a:spcBef>
+              <a:buFont typeface="Wingdings" panose="05000000000000000000" pitchFamily="2" charset="2"/>
+              <a:buChar char="Ø"/>
+            </a:pPr>
+            <a:r>
+              <a:rPr lang="en-US" sz="2800" dirty="0"/>
+              <a:t>How Transport Capabilities relates to </a:t>
+            </a:r>
+            <a:br>
+              <a:rPr lang="en-US" sz="2800" dirty="0"/>
+            </a:br>
+            <a:r>
+              <a:rPr lang="en-US" sz="2800" dirty="0"/>
+              <a:t>YANG-Push to Message Broker Integration Architecture</a:t>
+            </a:r>
+          </a:p>
+          <a:p>
+            <a:pPr marL="457200" indent="-457200">
+              <a:spcBef>
+                <a:spcPts val="1200"/>
+              </a:spcBef>
+              <a:buFont typeface="Wingdings" panose="05000000000000000000" pitchFamily="2" charset="2"/>
+              <a:buChar char="Ø"/>
+            </a:pPr>
+            <a:r>
+              <a:rPr lang="en-US" sz="2800" dirty="0"/>
+              <a:t>Document Changes since -00</a:t>
+            </a:r>
+          </a:p>
+          <a:p>
+            <a:pPr marL="457200" indent="-457200">
+              <a:spcBef>
+                <a:spcPts val="1200"/>
+              </a:spcBef>
+              <a:buFont typeface="Wingdings" panose="05000000000000000000" pitchFamily="2" charset="2"/>
+              <a:buChar char="Ø"/>
+            </a:pPr>
+            <a:r>
+              <a:rPr lang="en-US" sz="2800" dirty="0"/>
+              <a:t>Current Document Status</a:t>
+            </a:r>
+          </a:p>
+          <a:p>
+            <a:pPr marL="457200" indent="-457200">
+              <a:spcBef>
+                <a:spcPts val="1200"/>
+              </a:spcBef>
+              <a:buFont typeface="Wingdings" panose="05000000000000000000" pitchFamily="2" charset="2"/>
+              <a:buChar char="Ø"/>
+            </a:pPr>
+            <a:r>
+              <a:rPr lang="en-US" sz="2800" dirty="0"/>
+              <a:t>Next Steps</a:t>
+            </a:r>
+          </a:p>
+        </p:txBody>
+      </p:sp>
+      <p:sp>
+        <p:nvSpPr>
+          <p:cNvPr id="2" name="Slide Number Placeholder 1">
+            <a:extLst>
+              <a:ext uri="{FF2B5EF4-FFF2-40B4-BE49-F238E27FC236}">
+                <a16:creationId xmlns:a16="http://schemas.microsoft.com/office/drawing/2014/main" id="{AD23057C-339A-4254-8994-8EB77B8B4163}"/>
+              </a:ext>
+            </a:extLst>
+          </p:cNvPr>
+          <p:cNvSpPr>
+            <a:spLocks noGrp="1"/>
+          </p:cNvSpPr>
+          <p:nvPr>
+            <p:ph type="sldNum" sz="quarter" idx="12"/>
+          </p:nvPr>
+        </p:nvSpPr>
+        <p:spPr>
+          <a:xfrm>
+            <a:off x="11587892" y="6361637"/>
+            <a:ext cx="414251" cy="365125"/>
+          </a:xfrm>
+        </p:spPr>
+        <p:txBody>
+          <a:bodyPr/>
+          <a:lstStyle/>
+          <a:p>
+            <a:fld id="{FC4AC485-25DE-431E-B345-9C0A15BB7F8A}" type="slidenum">
+              <a:rPr lang="de-CH" sz="2200" smtClean="0"/>
+              <a:t>2</a:t>
+            </a:fld>
+            <a:endParaRPr lang="de-CH" sz="2200" dirty="0"/>
+          </a:p>
+        </p:txBody>
+      </p:sp>
+    </p:spTree>
+    <p:extLst>
+      <p:ext uri="{BB962C8B-B14F-4D97-AF65-F5344CB8AC3E}">
+        <p14:creationId xmlns:p14="http://schemas.microsoft.com/office/powerpoint/2010/main" val="461661054"/>
+      </p:ext>
+    </p:extLst>
+  </p:cSld>
+  <p:clrMapOvr>
+    <a:masterClrMapping/>
+  </p:clrMapOvr>
+</p:sld>
+</file>
+
+<file path=ppt/slides/slide3.xml><?xml version="1.0" encoding="utf-8"?>
+<p:sld xmlns:a="http://schemas.openxmlformats.org/drawingml/2006/main" xmlns:r="http://schemas.openxmlformats.org/officeDocument/2006/relationships" xmlns:p="http://schemas.openxmlformats.org/presentationml/2006/main">
+  <p:cSld>
+    <p:spTree>
+      <p:nvGrpSpPr>
+        <p:cNvPr id="1" name=""/>
+        <p:cNvGrpSpPr/>
+        <p:nvPr/>
+      </p:nvGrpSpPr>
+      <p:grpSpPr>
+        <a:xfrm>
+          <a:off x="0" y="0"/>
+          <a:ext cx="0" cy="0"/>
+          <a:chOff x="0" y="0"/>
+          <a:chExt cx="0" cy="0"/>
+        </a:xfrm>
+      </p:grpSpPr>
+      <p:pic>
+        <p:nvPicPr>
+          <p:cNvPr id="5" name="Picture 4">
+            <a:extLst>
+              <a:ext uri="{FF2B5EF4-FFF2-40B4-BE49-F238E27FC236}">
+                <a16:creationId xmlns:a16="http://schemas.microsoft.com/office/drawing/2014/main" id="{265163D7-4D63-1C0D-459F-0D85658F70CA}"/>
+              </a:ext>
+            </a:extLst>
+          </p:cNvPr>
+          <p:cNvPicPr>
+            <a:picLocks noChangeAspect="1"/>
+          </p:cNvPicPr>
+          <p:nvPr/>
+        </p:nvPicPr>
+        <p:blipFill>
+          <a:blip r:embed="rId3"/>
+          <a:stretch>
+            <a:fillRect/>
+          </a:stretch>
+        </p:blipFill>
+        <p:spPr>
+          <a:xfrm>
+            <a:off x="890236" y="1517046"/>
+            <a:ext cx="4216543" cy="5340954"/>
+          </a:xfrm>
+          <a:prstGeom prst="rect">
+            <a:avLst/>
+          </a:prstGeom>
+        </p:spPr>
+      </p:pic>
+      <p:sp>
+        <p:nvSpPr>
           <p:cNvPr id="2" name="Title 1">
             <a:extLst>
               <a:ext uri="{FF2B5EF4-FFF2-40B4-BE49-F238E27FC236}">
@@ -5901,31 +6151,31 @@
           <a:p>
             <a:r>
               <a:rPr lang="en-US" sz="1700" dirty="0">
-                <a:hlinkClick r:id="rId3"/>
+                <a:hlinkClick r:id="rId4"/>
               </a:rPr>
               <a:t>draft-</a:t>
             </a:r>
             <a:r>
               <a:rPr lang="en-US" sz="1700" dirty="0" err="1">
-                <a:hlinkClick r:id="rId3"/>
+                <a:hlinkClick r:id="rId4"/>
               </a:rPr>
               <a:t>ietf</a:t>
             </a:r>
             <a:r>
               <a:rPr lang="en-US" sz="1700" dirty="0">
-                <a:hlinkClick r:id="rId3"/>
+                <a:hlinkClick r:id="rId4"/>
               </a:rPr>
               <a:t>-</a:t>
             </a:r>
             <a:r>
               <a:rPr lang="en-US" sz="1700" dirty="0" err="1">
-                <a:hlinkClick r:id="rId3"/>
+                <a:hlinkClick r:id="rId4"/>
               </a:rPr>
               <a:t>nmop</a:t>
             </a:r>
             <a:r>
               <a:rPr lang="en-US" sz="1700" dirty="0">
-                <a:hlinkClick r:id="rId3"/>
+                <a:hlinkClick r:id="rId4"/>
               </a:rPr>
               <a:t>-yang-message-broker-integration</a:t>
             </a:r>
@@ -5937,68 +6187,68 @@
           <a:p>
             <a:r>
               <a:rPr lang="en-US" sz="1700" dirty="0">
+                <a:hlinkClick r:id="rId5"/>
+              </a:rPr>
+              <a:t>Section 4.1 of draft-</a:t>
+            </a:r>
+            <a:r>
+              <a:rPr lang="en-US" sz="1700" dirty="0" err="1">
+                <a:hlinkClick r:id="rId5"/>
+              </a:rPr>
+              <a:t>ietf</a:t>
+            </a:r>
+            <a:r>
+              <a:rPr lang="en-US" sz="1700" dirty="0">
+                <a:hlinkClick r:id="rId5"/>
+              </a:rPr>
+              <a:t>-</a:t>
+            </a:r>
+            <a:r>
+              <a:rPr lang="en-US" sz="1700" dirty="0" err="1">
+                <a:hlinkClick r:id="rId5"/>
+              </a:rPr>
+              <a:t>nmop</a:t>
+            </a:r>
+            <a:r>
+              <a:rPr lang="en-US" sz="1700" dirty="0">
+                <a:hlinkClick r:id="rId5"/>
+              </a:rPr>
+              <a:t>-yang-message-broker-integration</a:t>
+            </a:r>
+            <a:r>
+              <a:rPr lang="en-US" sz="1700" dirty="0"/>
+              <a:t> describes the YANG-Push subscription workflow where before the subscription configuration the transport, notification and subscription capabilities are being discovered first.</a:t>
+            </a:r>
+          </a:p>
+          <a:p>
+            <a:r>
+              <a:rPr lang="en-US" sz="1700" dirty="0">
                 <a:hlinkClick r:id="rId4"/>
               </a:rPr>
-              <a:t>Section 4.1 of draft-</a:t>
+              <a:t>draft-</a:t>
             </a:r>
             <a:r>
               <a:rPr lang="en-US" sz="1700" dirty="0" err="1">
                 <a:hlinkClick r:id="rId4"/>
               </a:rPr>
-              <a:t>ietf</a:t>
+              <a:t>netana</a:t>
             </a:r>
             <a:r>
               <a:rPr lang="en-US" sz="1700" dirty="0">
                 <a:hlinkClick r:id="rId4"/>
               </a:rPr>
-              <a:t>-</a:t>
+              <a:t>-netconf-</a:t>
             </a:r>
             <a:r>
               <a:rPr lang="en-US" sz="1700" dirty="0" err="1">
                 <a:hlinkClick r:id="rId4"/>
               </a:rPr>
-              <a:t>nmop</a:t>
+              <a:t>yp</a:t>
             </a:r>
             <a:r>
               <a:rPr lang="en-US" sz="1700" dirty="0">
                 <a:hlinkClick r:id="rId4"/>
               </a:rPr>
-              <a:t>-yang-message-broker-integration</a:t>
-            </a:r>
-            <a:r>
-              <a:rPr lang="en-US" sz="1700" dirty="0"/>
-              <a:t> describes the YANG-Push subscription workflow where before the subscription configuration the transport, notification and subscription capabilities are being discovered first.</a:t>
-            </a:r>
-          </a:p>
-          <a:p>
-            <a:r>
-              <a:rPr lang="en-US" sz="1700" dirty="0">
-                <a:hlinkClick r:id="rId3"/>
-              </a:rPr>
-              <a:t>draft-</a:t>
-            </a:r>
-            <a:r>
-              <a:rPr lang="en-US" sz="1700" dirty="0" err="1">
-                <a:hlinkClick r:id="rId3"/>
-              </a:rPr>
-              <a:t>netana</a:t>
-            </a:r>
-            <a:r>
-              <a:rPr lang="en-US" sz="1700" dirty="0">
-                <a:hlinkClick r:id="rId3"/>
-              </a:rPr>
-              <a:t>-netconf-</a:t>
-            </a:r>
-            <a:r>
-              <a:rPr lang="en-US" sz="1700" dirty="0" err="1">
-                <a:hlinkClick r:id="rId3"/>
-              </a:rPr>
-              <a:t>yp</a:t>
-            </a:r>
-            <a:r>
-              <a:rPr lang="en-US" sz="1700" dirty="0">
-                <a:hlinkClick r:id="rId3"/>
-              </a:rPr>
               <a:t>-transport-capabilities</a:t>
             </a:r>
             <a:r>
@@ -6015,31 +6265,31 @@
             </a:r>
             <a:r>
               <a:rPr lang="en-US" sz="1700" dirty="0">
-                <a:hlinkClick r:id="rId5"/>
+                <a:hlinkClick r:id="rId6"/>
               </a:rPr>
               <a:t>Section 3.2 of draft-</a:t>
             </a:r>
             <a:r>
               <a:rPr lang="en-US" sz="1700" dirty="0" err="1">
-                <a:hlinkClick r:id="rId5"/>
+                <a:hlinkClick r:id="rId6"/>
               </a:rPr>
               <a:t>netana</a:t>
             </a:r>
             <a:r>
               <a:rPr lang="en-US" sz="1700" dirty="0">
-                <a:hlinkClick r:id="rId5"/>
+                <a:hlinkClick r:id="rId6"/>
               </a:rPr>
               <a:t>-netconf-</a:t>
             </a:r>
             <a:r>
               <a:rPr lang="en-US" sz="1700" dirty="0" err="1">
-                <a:hlinkClick r:id="rId5"/>
+                <a:hlinkClick r:id="rId6"/>
               </a:rPr>
               <a:t>notif</a:t>
             </a:r>
             <a:r>
               <a:rPr lang="en-US" sz="1700" dirty="0">
-                <a:hlinkClick r:id="rId5"/>
+                <a:hlinkClick r:id="rId6"/>
               </a:rPr>
               <a:t>-envelope </a:t>
             </a:r>
@@ -6049,7 +6299,7 @@
             </a:r>
             <a:r>
               <a:rPr lang="en-US" sz="1700" dirty="0">
-                <a:hlinkClick r:id="rId6"/>
+                <a:hlinkClick r:id="rId7"/>
               </a:rPr>
               <a:t>Section 5.2 </a:t>
             </a:r>
@@ -6094,42 +6344,12 @@
           <a:p>
             <a:fld id="{FC4AC485-25DE-431E-B345-9C0A15BB7F8A}" type="slidenum">
               <a:rPr lang="de-CH" sz="1400" smtClean="0"/>
-              <a:t>2</a:t>
+              <a:t>3</a:t>
             </a:fld>
             <a:endParaRPr lang="de-CH" sz="1400" dirty="0"/>
           </a:p>
         </p:txBody>
       </p:sp>
-      <p:pic>
-        <p:nvPicPr>
-          <p:cNvPr id="4" name="Picture 3">
-            <a:extLst>
-              <a:ext uri="{FF2B5EF4-FFF2-40B4-BE49-F238E27FC236}">
-                <a16:creationId xmlns:a16="http://schemas.microsoft.com/office/drawing/2014/main" id="{AE8BF390-E5E9-1AC1-670D-320B2E27DC97}"/>
-              </a:ext>
-            </a:extLst>
-          </p:cNvPr>
-          <p:cNvPicPr>
-            <a:picLocks noChangeAspect="1"/>
-          </p:cNvPicPr>
-          <p:nvPr/>
-        </p:nvPicPr>
-        <p:blipFill>
-          <a:blip r:embed="rId7"/>
-          <a:stretch>
-            <a:fillRect/>
-          </a:stretch>
-        </p:blipFill>
-        <p:spPr>
-          <a:xfrm>
-            <a:off x="950167" y="1569597"/>
-            <a:ext cx="3855098" cy="5288403"/>
-          </a:xfrm>
-          <a:prstGeom prst="rect">
-            <a:avLst/>
-          </a:prstGeom>
-        </p:spPr>
-      </p:pic>
       <p:sp>
         <p:nvSpPr>
           <p:cNvPr id="6" name="Oval 5">
@@ -6199,7 +6419,7 @@
 </p:sld>
 </file>
 
-<file path=ppt/slides/slide3.xml><?xml version="1.0" encoding="utf-8"?>
+<file path=ppt/slides/slide4.xml><?xml version="1.0" encoding="utf-8"?>
 <p:sld xmlns:a="http://schemas.openxmlformats.org/drawingml/2006/main" xmlns:r="http://schemas.openxmlformats.org/officeDocument/2006/relationships" xmlns:p="http://schemas.openxmlformats.org/presentationml/2006/main">
   <p:cSld>
     <p:spTree>
@@ -6420,7 +6640,7 @@
           <a:p>
             <a:fld id="{FC4AC485-25DE-431E-B345-9C0A15BB7F8A}" type="slidenum">
               <a:rPr lang="de-CH" sz="1400" smtClean="0"/>
-              <a:t>3</a:t>
+              <a:t>4</a:t>
             </a:fld>
             <a:endParaRPr lang="de-CH" sz="1400" dirty="0"/>
           </a:p>
@@ -7306,7 +7526,7 @@
 </p:sld>
 </file>
 
-<file path=ppt/slides/slide4.xml><?xml version="1.0" encoding="utf-8"?>
+<file path=ppt/slides/slide5.xml><?xml version="1.0" encoding="utf-8"?>
 <p:sld xmlns:a="http://schemas.openxmlformats.org/drawingml/2006/main" xmlns:r="http://schemas.openxmlformats.org/officeDocument/2006/relationships" xmlns:p="http://schemas.openxmlformats.org/presentationml/2006/main">
   <p:cSld>
     <p:spTree>
@@ -7765,7 +7985,481 @@
           <a:p>
             <a:fld id="{FC4AC485-25DE-431E-B345-9C0A15BB7F8A}" type="slidenum">
               <a:rPr lang="de-CH" sz="1400" smtClean="0"/>
-              <a:t>4</a:t>
+              <a:t>5</a:t>
+            </a:fld>
+            <a:endParaRPr lang="de-CH" sz="1400" dirty="0"/>
+          </a:p>
+        </p:txBody>
+      </p:sp>
+    </p:spTree>
+    <p:extLst>
+      <p:ext uri="{BB962C8B-B14F-4D97-AF65-F5344CB8AC3E}">
+        <p14:creationId xmlns:p14="http://schemas.microsoft.com/office/powerpoint/2010/main" val="1767383836"/>
+      </p:ext>
+    </p:extLst>
+  </p:cSld>
+  <p:clrMapOvr>
+    <a:masterClrMapping/>
+  </p:clrMapOvr>
+</p:sld>
+</file>
+
+<file path=ppt/slides/slide6.xml><?xml version="1.0" encoding="utf-8"?>
+<p:sld xmlns:a="http://schemas.openxmlformats.org/drawingml/2006/main" xmlns:r="http://schemas.openxmlformats.org/officeDocument/2006/relationships" xmlns:p="http://schemas.openxmlformats.org/presentationml/2006/main">
+  <p:cSld>
+    <p:spTree>
+      <p:nvGrpSpPr>
+        <p:cNvPr id="1" name=""/>
+        <p:cNvGrpSpPr/>
+        <p:nvPr/>
+      </p:nvGrpSpPr>
+      <p:grpSpPr>
+        <a:xfrm>
+          <a:off x="0" y="0"/>
+          <a:ext cx="0" cy="0"/>
+          <a:chOff x="0" y="0"/>
+          <a:chExt cx="0" cy="0"/>
+        </a:xfrm>
+      </p:grpSpPr>
+      <p:sp>
+        <p:nvSpPr>
+          <p:cNvPr id="2" name="Title 1">
+            <a:extLst>
+              <a:ext uri="{FF2B5EF4-FFF2-40B4-BE49-F238E27FC236}">
+                <a16:creationId xmlns:a16="http://schemas.microsoft.com/office/drawing/2014/main" id="{FF20F271-6F0D-4AC0-BB1D-F5C338165C13}"/>
+              </a:ext>
+            </a:extLst>
+          </p:cNvPr>
+          <p:cNvSpPr>
+            <a:spLocks noGrp="1"/>
+          </p:cNvSpPr>
+          <p:nvPr>
+            <p:ph type="title"/>
+          </p:nvPr>
+        </p:nvSpPr>
+        <p:spPr/>
+        <p:txBody>
+          <a:bodyPr>
+            <a:normAutofit/>
+          </a:bodyPr>
+          <a:lstStyle/>
+          <a:p>
+            <a:r>
+              <a:rPr lang="en-US" sz="2800" b="1" dirty="0"/>
+              <a:t>YANG Notification </a:t>
+            </a:r>
+            <a:r>
+              <a:rPr lang="en-US" sz="2800" b="1" dirty="0">
+                <a:solidFill>
+                  <a:srgbClr val="FF0000"/>
+                </a:solidFill>
+              </a:rPr>
+              <a:t>Transport Capabilities</a:t>
+            </a:r>
+            <a:br>
+              <a:rPr lang="en-GB" sz="3200" dirty="0"/>
+            </a:br>
+            <a:r>
+              <a:rPr lang="en-US" sz="2400" dirty="0">
+                <a:solidFill>
+                  <a:schemeClr val="bg2">
+                    <a:lumMod val="75000"/>
+                  </a:schemeClr>
+                </a:solidFill>
+              </a:rPr>
+              <a:t>draft-netana-netconf-yp-transport-capabilities-01</a:t>
+            </a:r>
+            <a:r>
+              <a:rPr lang="en-GB" sz="2400" dirty="0">
+                <a:solidFill>
+                  <a:schemeClr val="bg2">
+                    <a:lumMod val="75000"/>
+                  </a:schemeClr>
+                </a:solidFill>
+              </a:rPr>
+              <a:t>  - </a:t>
+            </a:r>
+            <a:r>
+              <a:rPr lang="en-US" sz="2400" dirty="0">
+                <a:solidFill>
+                  <a:schemeClr val="bg2">
+                    <a:lumMod val="75000"/>
+                  </a:schemeClr>
+                </a:solidFill>
+              </a:rPr>
+              <a:t>Next Steps</a:t>
+            </a:r>
+            <a:endParaRPr lang="en-US" sz="3100" dirty="0">
+              <a:solidFill>
+                <a:schemeClr val="bg2">
+                  <a:lumMod val="75000"/>
+                </a:schemeClr>
+              </a:solidFill>
+            </a:endParaRPr>
+          </a:p>
+        </p:txBody>
+      </p:sp>
+      <p:sp>
+        <p:nvSpPr>
+          <p:cNvPr id="3" name="Content Placeholder 2">
+            <a:extLst>
+              <a:ext uri="{FF2B5EF4-FFF2-40B4-BE49-F238E27FC236}">
+                <a16:creationId xmlns:a16="http://schemas.microsoft.com/office/drawing/2014/main" id="{29C0DFD4-432D-4B0C-93DF-790441DCF5B9}"/>
+              </a:ext>
+            </a:extLst>
+          </p:cNvPr>
+          <p:cNvSpPr>
+            <a:spLocks noGrp="1"/>
+          </p:cNvSpPr>
+          <p:nvPr>
+            <p:ph idx="1"/>
+          </p:nvPr>
+        </p:nvSpPr>
+        <p:spPr>
+          <a:xfrm>
+            <a:off x="838198" y="1810138"/>
+            <a:ext cx="9144000" cy="4441371"/>
+          </a:xfrm>
+        </p:spPr>
+        <p:txBody>
+          <a:bodyPr>
+            <a:noAutofit/>
+          </a:bodyPr>
+          <a:lstStyle/>
+          <a:p>
+            <a:pPr marL="0" indent="0">
+              <a:spcBef>
+                <a:spcPts val="1200"/>
+              </a:spcBef>
+              <a:buNone/>
+            </a:pPr>
+            <a:r>
+              <a:rPr lang="en-US" sz="1700" b="1" dirty="0"/>
+              <a:t>Next Steps</a:t>
+            </a:r>
+          </a:p>
+          <a:p>
+            <a:pPr>
+              <a:spcBef>
+                <a:spcPts val="1200"/>
+              </a:spcBef>
+              <a:buFont typeface="Wingdings" panose="05000000000000000000" pitchFamily="2" charset="2"/>
+              <a:buChar char="Ø"/>
+            </a:pPr>
+            <a:r>
+              <a:rPr lang="en-US" sz="1700" dirty="0"/>
+              <a:t>Network operators require YANG-Push capabilities discovery mechanism to automate </a:t>
+            </a:r>
+            <a:br>
+              <a:rPr lang="en-US" sz="1700" dirty="0"/>
+            </a:br>
+            <a:r>
+              <a:rPr lang="en-US" sz="1700" dirty="0">
+                <a:hlinkClick r:id="rId3"/>
+              </a:rPr>
+              <a:t>RFC 8639</a:t>
+            </a:r>
+            <a:r>
+              <a:rPr lang="en-US" sz="1700" dirty="0"/>
+              <a:t>/</a:t>
+            </a:r>
+            <a:r>
+              <a:rPr lang="en-US" sz="1700" dirty="0">
+                <a:hlinkClick r:id="rId4"/>
+              </a:rPr>
+              <a:t>8641</a:t>
+            </a:r>
+            <a:r>
+              <a:rPr lang="en-US" sz="1700" dirty="0"/>
+              <a:t> YANG-Push subscription process. This is one of the major pain points of todays legacy, non-standard YANG-Push implementations.</a:t>
+            </a:r>
+          </a:p>
+          <a:p>
+            <a:pPr>
+              <a:spcBef>
+                <a:spcPts val="1200"/>
+              </a:spcBef>
+              <a:buFont typeface="Wingdings" panose="05000000000000000000" pitchFamily="2" charset="2"/>
+              <a:buChar char="Ø"/>
+            </a:pPr>
+            <a:r>
+              <a:rPr lang="en-US" sz="1700" dirty="0">
+                <a:hlinkClick r:id="rId5"/>
+              </a:rPr>
+              <a:t>RFC 9196 </a:t>
+            </a:r>
+            <a:r>
+              <a:rPr lang="en-US" sz="1700" dirty="0"/>
+              <a:t>does address network operators' needs, and this </a:t>
+            </a:r>
+            <a:r>
+              <a:rPr lang="en-US" sz="1700"/>
+              <a:t>document complements the </a:t>
+            </a:r>
+            <a:r>
+              <a:rPr lang="en-US" sz="1700" dirty="0"/>
+              <a:t>YANG-Push configured subscription transport capabilities aspect. </a:t>
+            </a:r>
+          </a:p>
+          <a:p>
+            <a:pPr>
+              <a:spcBef>
+                <a:spcPts val="1200"/>
+              </a:spcBef>
+              <a:buFont typeface="Wingdings" panose="05000000000000000000" pitchFamily="2" charset="2"/>
+              <a:buChar char="Ø"/>
+            </a:pPr>
+            <a:r>
+              <a:rPr lang="en-US" sz="1700" dirty="0"/>
+              <a:t>Considering that this is the 9</a:t>
+            </a:r>
+            <a:r>
+              <a:rPr lang="en-US" sz="1700" baseline="30000" dirty="0"/>
+              <a:t>th</a:t>
+            </a:r>
+            <a:r>
+              <a:rPr lang="en-US" sz="1700" dirty="0"/>
+              <a:t> document iteration and stable, and that 4 major implementations</a:t>
+            </a:r>
+            <a:br>
+              <a:rPr lang="en-US" sz="1700" dirty="0"/>
+            </a:br>
+            <a:r>
+              <a:rPr lang="en-US" sz="1700" dirty="0"/>
+              <a:t>are under way, the authors are concerned that if the NETCONF working group doesn’t adopt the document now then there is no sufficient time to discuss before implementations becoming general available.</a:t>
+            </a:r>
+          </a:p>
+          <a:p>
+            <a:pPr>
+              <a:spcBef>
+                <a:spcPts val="1200"/>
+              </a:spcBef>
+              <a:buFont typeface="Wingdings" panose="05000000000000000000" pitchFamily="2" charset="2"/>
+              <a:buChar char="Ø"/>
+            </a:pPr>
+            <a:r>
+              <a:rPr lang="en-US" sz="1700" b="1" dirty="0">
+                <a:solidFill>
+                  <a:srgbClr val="FF0000"/>
+                </a:solidFill>
+              </a:rPr>
+              <a:t>Authors therefore request to raise a poll on February 10</a:t>
+            </a:r>
+            <a:r>
+              <a:rPr lang="en-US" sz="1700" b="1" baseline="30000" dirty="0">
+                <a:solidFill>
+                  <a:srgbClr val="FF0000"/>
+                </a:solidFill>
+              </a:rPr>
+              <a:t>th</a:t>
+            </a:r>
+            <a:r>
+              <a:rPr lang="en-US" sz="1700" b="1" dirty="0">
+                <a:solidFill>
+                  <a:srgbClr val="FF0000"/>
+                </a:solidFill>
+              </a:rPr>
+              <a:t> interim </a:t>
+            </a:r>
+            <a:r>
+              <a:rPr lang="en-US" sz="1700" dirty="0"/>
+              <a:t>to clarify wherever document</a:t>
+            </a:r>
+            <a:br>
+              <a:rPr lang="en-US" sz="1700" dirty="0"/>
+            </a:br>
+            <a:r>
+              <a:rPr lang="en-US" sz="1700" dirty="0"/>
+              <a:t>addresses the discoverability requirements defined in </a:t>
+            </a:r>
+            <a:r>
+              <a:rPr lang="en-US" sz="1700" dirty="0">
+                <a:hlinkClick r:id="rId6"/>
+              </a:rPr>
+              <a:t>Section 7 of RFC 8639 </a:t>
+            </a:r>
+            <a:r>
+              <a:rPr lang="en-US" sz="1700" dirty="0"/>
+              <a:t>and</a:t>
+            </a:r>
+            <a:r>
+              <a:rPr lang="en-US" sz="1700" b="1" dirty="0">
+                <a:solidFill>
+                  <a:srgbClr val="FF0000"/>
+                </a:solidFill>
+              </a:rPr>
+              <a:t> </a:t>
+            </a:r>
+            <a:r>
+              <a:rPr lang="en-US" sz="1700" dirty="0">
+                <a:hlinkClick r:id="rId7"/>
+              </a:rPr>
+              <a:t>errata 6211</a:t>
+            </a:r>
+            <a:r>
+              <a:rPr lang="en-US" sz="1700" b="1" dirty="0">
+                <a:solidFill>
+                  <a:srgbClr val="FF0000"/>
+                </a:solidFill>
+              </a:rPr>
+              <a:t> </a:t>
+            </a:r>
+            <a:r>
+              <a:rPr lang="en-US" sz="1700" dirty="0"/>
+              <a:t>for</a:t>
+            </a:r>
+            <a:r>
+              <a:rPr lang="en-US" sz="1700" b="1" dirty="0">
+                <a:solidFill>
+                  <a:srgbClr val="FF0000"/>
+                </a:solidFill>
+              </a:rPr>
+              <a:t> </a:t>
+            </a:r>
+            <a:br>
+              <a:rPr lang="en-US" sz="1700" b="1" dirty="0">
+                <a:solidFill>
+                  <a:srgbClr val="FF0000"/>
+                </a:solidFill>
+              </a:rPr>
+            </a:br>
+            <a:r>
+              <a:rPr lang="en-US" sz="1700" dirty="0">
+                <a:hlinkClick r:id="rId8"/>
+              </a:rPr>
+              <a:t>draft-</a:t>
+            </a:r>
+            <a:r>
+              <a:rPr lang="en-US" sz="1700" dirty="0" err="1">
+                <a:hlinkClick r:id="rId8"/>
+              </a:rPr>
+              <a:t>ietf</a:t>
+            </a:r>
+            <a:r>
+              <a:rPr lang="en-US" sz="1700" dirty="0">
+                <a:hlinkClick r:id="rId8"/>
+              </a:rPr>
+              <a:t>-netconf-</a:t>
+            </a:r>
+            <a:r>
+              <a:rPr lang="en-US" sz="1700" dirty="0" err="1">
+                <a:hlinkClick r:id="rId8"/>
+              </a:rPr>
+              <a:t>udp</a:t>
+            </a:r>
+            <a:r>
+              <a:rPr lang="en-US" sz="1700" dirty="0">
+                <a:hlinkClick r:id="rId8"/>
+              </a:rPr>
+              <a:t>-</a:t>
+            </a:r>
+            <a:r>
+              <a:rPr lang="en-US" sz="1700" dirty="0" err="1">
+                <a:hlinkClick r:id="rId8"/>
+              </a:rPr>
+              <a:t>notif</a:t>
+            </a:r>
+            <a:r>
+              <a:rPr lang="en-US" sz="1700" dirty="0"/>
+              <a:t>  and </a:t>
+            </a:r>
+            <a:r>
+              <a:rPr lang="en-US" sz="1700" dirty="0">
+                <a:hlinkClick r:id="rId9"/>
+              </a:rPr>
+              <a:t>draft-</a:t>
+            </a:r>
+            <a:r>
+              <a:rPr lang="en-US" sz="1700" dirty="0" err="1">
+                <a:hlinkClick r:id="rId9"/>
+              </a:rPr>
+              <a:t>ietf</a:t>
+            </a:r>
+            <a:r>
+              <a:rPr lang="en-US" sz="1700" dirty="0">
+                <a:hlinkClick r:id="rId9"/>
+              </a:rPr>
+              <a:t>-netconf-https-</a:t>
+            </a:r>
+            <a:r>
+              <a:rPr lang="en-US" sz="1700" dirty="0" err="1">
+                <a:hlinkClick r:id="rId9"/>
+              </a:rPr>
+              <a:t>notif</a:t>
+            </a:r>
+            <a:r>
+              <a:rPr lang="en-US" sz="1700" dirty="0"/>
+              <a:t> </a:t>
+            </a:r>
+            <a:r>
+              <a:rPr lang="en-US" sz="1700" b="1" dirty="0">
+                <a:solidFill>
+                  <a:srgbClr val="FF0000"/>
+                </a:solidFill>
+              </a:rPr>
+              <a:t>to receive additional feedback </a:t>
+            </a:r>
+            <a:br>
+              <a:rPr lang="en-US" sz="1700" b="1" dirty="0">
+                <a:solidFill>
+                  <a:srgbClr val="FF0000"/>
+                </a:solidFill>
+              </a:rPr>
+            </a:br>
+            <a:r>
+              <a:rPr lang="en-US" sz="1700" b="1" dirty="0">
+                <a:solidFill>
+                  <a:srgbClr val="FF0000"/>
+                </a:solidFill>
+              </a:rPr>
+              <a:t>from the working group and initiate working group adoption call.</a:t>
+            </a:r>
+          </a:p>
+          <a:p>
+            <a:pPr>
+              <a:spcBef>
+                <a:spcPts val="600"/>
+              </a:spcBef>
+              <a:buFont typeface="Wingdings" panose="05000000000000000000" pitchFamily="2" charset="2"/>
+              <a:buChar char="Ø"/>
+            </a:pPr>
+            <a:endParaRPr lang="en-US" sz="1700" b="1" dirty="0">
+              <a:solidFill>
+                <a:srgbClr val="FF0000"/>
+              </a:solidFill>
+            </a:endParaRPr>
+          </a:p>
+        </p:txBody>
+      </p:sp>
+      <p:sp>
+        <p:nvSpPr>
+          <p:cNvPr id="7" name="Slide Number Placeholder 1">
+            <a:extLst>
+              <a:ext uri="{FF2B5EF4-FFF2-40B4-BE49-F238E27FC236}">
+                <a16:creationId xmlns:a16="http://schemas.microsoft.com/office/drawing/2014/main" id="{431654D8-5CEC-4B8C-A548-2C0DECDF0A19}"/>
+              </a:ext>
+            </a:extLst>
+          </p:cNvPr>
+          <p:cNvSpPr>
+            <a:spLocks noGrp="1"/>
+          </p:cNvSpPr>
+          <p:nvPr>
+            <p:ph type="sldNum" sz="quarter" idx="12"/>
+          </p:nvPr>
+        </p:nvSpPr>
+        <p:spPr>
+          <a:xfrm>
+            <a:off x="11587892" y="6361637"/>
+            <a:ext cx="414251" cy="365125"/>
+          </a:xfrm>
+        </p:spPr>
+        <p:txBody>
+          <a:bodyPr/>
+          <a:lstStyle/>
+          <a:p>
+            <a:fld id="{FC4AC485-25DE-431E-B345-9C0A15BB7F8A}" type="slidenum">
+              <a:rPr lang="de-CH" sz="1400" smtClean="0"/>
+              <a:t>6</a:t>
             </a:fld>
             <a:endParaRPr lang="de-CH" sz="1400" dirty="0"/>
           </a:p>
@@ -8037,775 +8731,7 @@
               <a:rPr lang="de-CH" sz="3800" dirty="0">
                 <a:latin typeface="+mj-lt"/>
               </a:rPr>
-              <a:t>2. </a:t>
-            </a:r>
-            <a:r>
-              <a:rPr lang="de-CH" sz="3800" dirty="0" err="1">
-                <a:latin typeface="+mj-lt"/>
-                <a:ea typeface="+mj-ea"/>
-                <a:cs typeface="+mj-cs"/>
-              </a:rPr>
-              <a:t>February</a:t>
-            </a:r>
-            <a:r>
-              <a:rPr lang="de-CH" sz="3800" dirty="0">
-                <a:latin typeface="+mj-lt"/>
-                <a:ea typeface="+mj-ea"/>
-                <a:cs typeface="+mj-cs"/>
-              </a:rPr>
-              <a:t> 2025</a:t>
-            </a:r>
-            <a:endParaRPr lang="de-CH" sz="3800" dirty="0">
-              <a:latin typeface="+mj-lt"/>
-            </a:endParaRPr>
-          </a:p>
-          <a:p>
-            <a:pPr algn="r"/>
-            <a:endParaRPr lang="de-CH" sz="2200" dirty="0"/>
-          </a:p>
-        </p:txBody>
-      </p:sp>
-    </p:spTree>
-    <p:extLst>
-      <p:ext uri="{BB962C8B-B14F-4D97-AF65-F5344CB8AC3E}">
-        <p14:creationId xmlns:p14="http://schemas.microsoft.com/office/powerpoint/2010/main" val="1767383836"/>
-      </p:ext>
-    </p:extLst>
-  </p:cSld>
-  <p:clrMapOvr>
-    <a:masterClrMapping/>
-  </p:clrMapOvr>
-</p:sld>
-</file>
-
-<file path=ppt/slides/slide5.xml><?xml version="1.0" encoding="utf-8"?>
-<p:sld xmlns:a="http://schemas.openxmlformats.org/drawingml/2006/main" xmlns:r="http://schemas.openxmlformats.org/officeDocument/2006/relationships" xmlns:p="http://schemas.openxmlformats.org/presentationml/2006/main">
-  <p:cSld>
-    <p:spTree>
-      <p:nvGrpSpPr>
-        <p:cNvPr id="1" name=""/>
-        <p:cNvGrpSpPr/>
-        <p:nvPr/>
-      </p:nvGrpSpPr>
-      <p:grpSpPr>
-        <a:xfrm>
-          <a:off x="0" y="0"/>
-          <a:ext cx="0" cy="0"/>
-          <a:chOff x="0" y="0"/>
-          <a:chExt cx="0" cy="0"/>
-        </a:xfrm>
-      </p:grpSpPr>
-      <p:sp>
-        <p:nvSpPr>
-          <p:cNvPr id="2" name="Title 1">
-            <a:extLst>
-              <a:ext uri="{FF2B5EF4-FFF2-40B4-BE49-F238E27FC236}">
-                <a16:creationId xmlns:a16="http://schemas.microsoft.com/office/drawing/2014/main" id="{FF20F271-6F0D-4AC0-BB1D-F5C338165C13}"/>
-              </a:ext>
-            </a:extLst>
-          </p:cNvPr>
-          <p:cNvSpPr>
-            <a:spLocks noGrp="1"/>
-          </p:cNvSpPr>
-          <p:nvPr>
-            <p:ph type="title"/>
-          </p:nvPr>
-        </p:nvSpPr>
-        <p:spPr/>
-        <p:txBody>
-          <a:bodyPr>
-            <a:normAutofit/>
-          </a:bodyPr>
-          <a:lstStyle/>
-          <a:p>
-            <a:r>
-              <a:rPr lang="en-US" sz="2800" b="1" dirty="0"/>
-              <a:t>YANG Notification </a:t>
-            </a:r>
-            <a:r>
-              <a:rPr lang="en-US" sz="2800" b="1" dirty="0">
-                <a:solidFill>
-                  <a:srgbClr val="FF0000"/>
-                </a:solidFill>
-              </a:rPr>
-              <a:t>Transport Capabilities</a:t>
-            </a:r>
-            <a:br>
-              <a:rPr lang="en-GB" sz="3200" dirty="0"/>
-            </a:br>
-            <a:r>
-              <a:rPr lang="en-US" sz="2400" dirty="0">
-                <a:solidFill>
-                  <a:schemeClr val="bg2">
-                    <a:lumMod val="75000"/>
-                  </a:schemeClr>
-                </a:solidFill>
-              </a:rPr>
-              <a:t>draft-netana-netconf-yp-transport-capabilities-01</a:t>
-            </a:r>
-            <a:r>
-              <a:rPr lang="en-GB" sz="2400" dirty="0">
-                <a:solidFill>
-                  <a:schemeClr val="bg2">
-                    <a:lumMod val="75000"/>
-                  </a:schemeClr>
-                </a:solidFill>
-              </a:rPr>
-              <a:t>  - </a:t>
-            </a:r>
-            <a:r>
-              <a:rPr lang="en-US" sz="2400" dirty="0">
-                <a:solidFill>
-                  <a:schemeClr val="bg2">
-                    <a:lumMod val="75000"/>
-                  </a:schemeClr>
-                </a:solidFill>
-              </a:rPr>
-              <a:t>Next Steps</a:t>
-            </a:r>
-            <a:endParaRPr lang="en-US" sz="3100" dirty="0">
-              <a:solidFill>
-                <a:schemeClr val="bg2">
-                  <a:lumMod val="75000"/>
-                </a:schemeClr>
-              </a:solidFill>
-            </a:endParaRPr>
-          </a:p>
-        </p:txBody>
-      </p:sp>
-      <p:sp>
-        <p:nvSpPr>
-          <p:cNvPr id="3" name="Content Placeholder 2">
-            <a:extLst>
-              <a:ext uri="{FF2B5EF4-FFF2-40B4-BE49-F238E27FC236}">
-                <a16:creationId xmlns:a16="http://schemas.microsoft.com/office/drawing/2014/main" id="{29C0DFD4-432D-4B0C-93DF-790441DCF5B9}"/>
-              </a:ext>
-            </a:extLst>
-          </p:cNvPr>
-          <p:cNvSpPr>
-            <a:spLocks noGrp="1"/>
-          </p:cNvSpPr>
-          <p:nvPr>
-            <p:ph idx="1"/>
-          </p:nvPr>
-        </p:nvSpPr>
-        <p:spPr>
-          <a:xfrm>
-            <a:off x="838198" y="1810138"/>
-            <a:ext cx="9144000" cy="4441371"/>
-          </a:xfrm>
-        </p:spPr>
-        <p:txBody>
-          <a:bodyPr>
-            <a:noAutofit/>
-          </a:bodyPr>
-          <a:lstStyle/>
-          <a:p>
-            <a:pPr marL="0" indent="0">
-              <a:spcBef>
-                <a:spcPts val="1200"/>
-              </a:spcBef>
-              <a:buNone/>
-            </a:pPr>
-            <a:r>
-              <a:rPr lang="en-US" sz="1700" b="1" dirty="0"/>
-              <a:t>Next Steps</a:t>
-            </a:r>
-          </a:p>
-          <a:p>
-            <a:pPr>
-              <a:spcBef>
-                <a:spcPts val="1200"/>
-              </a:spcBef>
-              <a:buFont typeface="Wingdings" panose="05000000000000000000" pitchFamily="2" charset="2"/>
-              <a:buChar char="Ø"/>
-            </a:pPr>
-            <a:r>
-              <a:rPr lang="en-US" sz="1700" dirty="0"/>
-              <a:t>Network operators require YANG-Push capabilities discovery mechanism to automate </a:t>
-            </a:r>
-            <a:br>
-              <a:rPr lang="en-US" sz="1700" dirty="0"/>
-            </a:br>
-            <a:r>
-              <a:rPr lang="en-US" sz="1700" dirty="0">
-                <a:hlinkClick r:id="rId3"/>
-              </a:rPr>
-              <a:t>RFC 8639</a:t>
-            </a:r>
-            <a:r>
-              <a:rPr lang="en-US" sz="1700" dirty="0"/>
-              <a:t>/</a:t>
-            </a:r>
-            <a:r>
-              <a:rPr lang="en-US" sz="1700" dirty="0">
-                <a:hlinkClick r:id="rId4"/>
-              </a:rPr>
-              <a:t>8641</a:t>
-            </a:r>
-            <a:r>
-              <a:rPr lang="en-US" sz="1700" dirty="0"/>
-              <a:t> YANG-Push subscription process. This is one of the major pain points of todays legacy, non-standard YANG-Push implementations.</a:t>
-            </a:r>
-          </a:p>
-          <a:p>
-            <a:pPr>
-              <a:spcBef>
-                <a:spcPts val="1200"/>
-              </a:spcBef>
-              <a:buFont typeface="Wingdings" panose="05000000000000000000" pitchFamily="2" charset="2"/>
-              <a:buChar char="Ø"/>
-            </a:pPr>
-            <a:r>
-              <a:rPr lang="en-US" sz="1700" dirty="0">
-                <a:hlinkClick r:id="rId5"/>
-              </a:rPr>
-              <a:t>RFC 9196 </a:t>
-            </a:r>
-            <a:r>
-              <a:rPr lang="en-US" sz="1700" dirty="0"/>
-              <a:t>does address network operators' needs, and this </a:t>
-            </a:r>
-            <a:r>
-              <a:rPr lang="en-US" sz="1700"/>
-              <a:t>document complements the </a:t>
-            </a:r>
-            <a:r>
-              <a:rPr lang="en-US" sz="1700" dirty="0"/>
-              <a:t>YANG-Push configured subscription transport capabilities aspect. </a:t>
-            </a:r>
-          </a:p>
-          <a:p>
-            <a:pPr>
-              <a:spcBef>
-                <a:spcPts val="1200"/>
-              </a:spcBef>
-              <a:buFont typeface="Wingdings" panose="05000000000000000000" pitchFamily="2" charset="2"/>
-              <a:buChar char="Ø"/>
-            </a:pPr>
-            <a:r>
-              <a:rPr lang="en-US" sz="1700" dirty="0"/>
-              <a:t>Considering that this is the 9</a:t>
-            </a:r>
-            <a:r>
-              <a:rPr lang="en-US" sz="1700" baseline="30000" dirty="0"/>
-              <a:t>th</a:t>
-            </a:r>
-            <a:r>
-              <a:rPr lang="en-US" sz="1700" dirty="0"/>
-              <a:t> document iteration and stable, and that 4 major implementations</a:t>
-            </a:r>
-            <a:br>
-              <a:rPr lang="en-US" sz="1700" dirty="0"/>
-            </a:br>
-            <a:r>
-              <a:rPr lang="en-US" sz="1700" dirty="0"/>
-              <a:t>are under way, the authors are concerned that if the NETCONF working group doesn’t adopt the document now then there is no sufficient time to discuss before implementations becoming general available.</a:t>
-            </a:r>
-          </a:p>
-          <a:p>
-            <a:pPr>
-              <a:spcBef>
-                <a:spcPts val="1200"/>
-              </a:spcBef>
-              <a:buFont typeface="Wingdings" panose="05000000000000000000" pitchFamily="2" charset="2"/>
-              <a:buChar char="Ø"/>
-            </a:pPr>
-            <a:r>
-              <a:rPr lang="en-US" sz="1700" b="1" dirty="0">
-                <a:solidFill>
-                  <a:srgbClr val="FF0000"/>
-                </a:solidFill>
-              </a:rPr>
-              <a:t>Authors therefore request to raise a poll on February 10</a:t>
-            </a:r>
-            <a:r>
-              <a:rPr lang="en-US" sz="1700" b="1" baseline="30000" dirty="0">
-                <a:solidFill>
-                  <a:srgbClr val="FF0000"/>
-                </a:solidFill>
-              </a:rPr>
-              <a:t>th</a:t>
-            </a:r>
-            <a:r>
-              <a:rPr lang="en-US" sz="1700" b="1" dirty="0">
-                <a:solidFill>
-                  <a:srgbClr val="FF0000"/>
-                </a:solidFill>
-              </a:rPr>
-              <a:t> interim </a:t>
-            </a:r>
-            <a:r>
-              <a:rPr lang="en-US" sz="1700" dirty="0"/>
-              <a:t>to clarify wherever document</a:t>
-            </a:r>
-            <a:br>
-              <a:rPr lang="en-US" sz="1700" dirty="0"/>
-            </a:br>
-            <a:r>
-              <a:rPr lang="en-US" sz="1700" dirty="0"/>
-              <a:t>addresses the discoverability requirements defined in </a:t>
-            </a:r>
-            <a:r>
-              <a:rPr lang="en-US" sz="1700" dirty="0">
-                <a:hlinkClick r:id="rId6"/>
-              </a:rPr>
-              <a:t>Section 7 of RFC 8639 </a:t>
-            </a:r>
-            <a:r>
-              <a:rPr lang="en-US" sz="1700" dirty="0"/>
-              <a:t>and</a:t>
-            </a:r>
-            <a:r>
-              <a:rPr lang="en-US" sz="1700" b="1" dirty="0">
-                <a:solidFill>
-                  <a:srgbClr val="FF0000"/>
-                </a:solidFill>
-              </a:rPr>
-              <a:t> </a:t>
-            </a:r>
-            <a:r>
-              <a:rPr lang="en-US" sz="1700" dirty="0">
-                <a:hlinkClick r:id="rId7"/>
-              </a:rPr>
-              <a:t>errata 6211</a:t>
-            </a:r>
-            <a:r>
-              <a:rPr lang="en-US" sz="1700" b="1" dirty="0">
-                <a:solidFill>
-                  <a:srgbClr val="FF0000"/>
-                </a:solidFill>
-              </a:rPr>
-              <a:t> </a:t>
-            </a:r>
-            <a:r>
-              <a:rPr lang="en-US" sz="1700" dirty="0"/>
-              <a:t>for</a:t>
-            </a:r>
-            <a:r>
-              <a:rPr lang="en-US" sz="1700" b="1" dirty="0">
-                <a:solidFill>
-                  <a:srgbClr val="FF0000"/>
-                </a:solidFill>
-              </a:rPr>
-              <a:t> </a:t>
-            </a:r>
-            <a:br>
-              <a:rPr lang="en-US" sz="1700" b="1" dirty="0">
-                <a:solidFill>
-                  <a:srgbClr val="FF0000"/>
-                </a:solidFill>
-              </a:rPr>
-            </a:br>
-            <a:r>
-              <a:rPr lang="en-US" sz="1700" dirty="0">
-                <a:hlinkClick r:id="rId8"/>
-              </a:rPr>
-              <a:t>draft-</a:t>
-            </a:r>
-            <a:r>
-              <a:rPr lang="en-US" sz="1700" dirty="0" err="1">
-                <a:hlinkClick r:id="rId8"/>
-              </a:rPr>
-              <a:t>ietf</a:t>
-            </a:r>
-            <a:r>
-              <a:rPr lang="en-US" sz="1700" dirty="0">
-                <a:hlinkClick r:id="rId8"/>
-              </a:rPr>
-              <a:t>-netconf-</a:t>
-            </a:r>
-            <a:r>
-              <a:rPr lang="en-US" sz="1700" dirty="0" err="1">
-                <a:hlinkClick r:id="rId8"/>
-              </a:rPr>
-              <a:t>udp</a:t>
-            </a:r>
-            <a:r>
-              <a:rPr lang="en-US" sz="1700" dirty="0">
-                <a:hlinkClick r:id="rId8"/>
-              </a:rPr>
-              <a:t>-</a:t>
-            </a:r>
-            <a:r>
-              <a:rPr lang="en-US" sz="1700" dirty="0" err="1">
-                <a:hlinkClick r:id="rId8"/>
-              </a:rPr>
-              <a:t>notif</a:t>
-            </a:r>
-            <a:r>
-              <a:rPr lang="en-US" sz="1700" dirty="0"/>
-              <a:t>  and </a:t>
-            </a:r>
-            <a:r>
-              <a:rPr lang="en-US" sz="1700" dirty="0">
-                <a:hlinkClick r:id="rId9"/>
-              </a:rPr>
-              <a:t>draft-</a:t>
-            </a:r>
-            <a:r>
-              <a:rPr lang="en-US" sz="1700" dirty="0" err="1">
-                <a:hlinkClick r:id="rId9"/>
-              </a:rPr>
-              <a:t>ietf</a:t>
-            </a:r>
-            <a:r>
-              <a:rPr lang="en-US" sz="1700" dirty="0">
-                <a:hlinkClick r:id="rId9"/>
-              </a:rPr>
-              <a:t>-netconf-https-</a:t>
-            </a:r>
-            <a:r>
-              <a:rPr lang="en-US" sz="1700" dirty="0" err="1">
-                <a:hlinkClick r:id="rId9"/>
-              </a:rPr>
-              <a:t>notif</a:t>
-            </a:r>
-            <a:r>
-              <a:rPr lang="en-US" sz="1700" dirty="0"/>
-              <a:t> </a:t>
-            </a:r>
-            <a:r>
-              <a:rPr lang="en-US" sz="1700" b="1" dirty="0">
-                <a:solidFill>
-                  <a:srgbClr val="FF0000"/>
-                </a:solidFill>
-              </a:rPr>
-              <a:t>to receive additional feedback </a:t>
-            </a:r>
-            <a:br>
-              <a:rPr lang="en-US" sz="1700" b="1" dirty="0">
-                <a:solidFill>
-                  <a:srgbClr val="FF0000"/>
-                </a:solidFill>
-              </a:rPr>
-            </a:br>
-            <a:r>
-              <a:rPr lang="en-US" sz="1700" b="1" dirty="0">
-                <a:solidFill>
-                  <a:srgbClr val="FF0000"/>
-                </a:solidFill>
-              </a:rPr>
-              <a:t>from the working group and initiate working group adoption call.</a:t>
-            </a:r>
-          </a:p>
-          <a:p>
-            <a:pPr>
-              <a:spcBef>
-                <a:spcPts val="600"/>
-              </a:spcBef>
-              <a:buFont typeface="Wingdings" panose="05000000000000000000" pitchFamily="2" charset="2"/>
-              <a:buChar char="Ø"/>
-            </a:pPr>
-            <a:endParaRPr lang="en-US" sz="1700" b="1" dirty="0">
-              <a:solidFill>
-                <a:srgbClr val="FF0000"/>
-              </a:solidFill>
-            </a:endParaRPr>
-          </a:p>
-        </p:txBody>
-      </p:sp>
-      <p:sp>
-        <p:nvSpPr>
-          <p:cNvPr id="7" name="Slide Number Placeholder 1">
-            <a:extLst>
-              <a:ext uri="{FF2B5EF4-FFF2-40B4-BE49-F238E27FC236}">
-                <a16:creationId xmlns:a16="http://schemas.microsoft.com/office/drawing/2014/main" id="{431654D8-5CEC-4B8C-A548-2C0DECDF0A19}"/>
-              </a:ext>
-            </a:extLst>
-          </p:cNvPr>
-          <p:cNvSpPr>
-            <a:spLocks noGrp="1"/>
-          </p:cNvSpPr>
-          <p:nvPr>
-            <p:ph type="sldNum" sz="quarter" idx="12"/>
-          </p:nvPr>
-        </p:nvSpPr>
-        <p:spPr>
-          <a:xfrm>
-            <a:off x="11587892" y="6361637"/>
-            <a:ext cx="414251" cy="365125"/>
-          </a:xfrm>
-        </p:spPr>
-        <p:txBody>
-          <a:bodyPr/>
-          <a:lstStyle/>
-          <a:p>
-            <a:fld id="{FC4AC485-25DE-431E-B345-9C0A15BB7F8A}" type="slidenum">
-              <a:rPr lang="de-CH" sz="1400" smtClean="0"/>
-              <a:t>5</a:t>
-            </a:fld>
-            <a:endParaRPr lang="de-CH" sz="1400" dirty="0"/>
-          </a:p>
-        </p:txBody>
-      </p:sp>
-      <p:sp>
-        <p:nvSpPr>
-          <p:cNvPr id="4" name="Subtitle 4">
-            <a:extLst>
-              <a:ext uri="{FF2B5EF4-FFF2-40B4-BE49-F238E27FC236}">
-                <a16:creationId xmlns:a16="http://schemas.microsoft.com/office/drawing/2014/main" id="{15F8C987-861D-7CFE-2544-77166341489C}"/>
-              </a:ext>
-            </a:extLst>
-          </p:cNvPr>
-          <p:cNvSpPr txBox="1">
-            <a:spLocks/>
-          </p:cNvSpPr>
-          <p:nvPr/>
-        </p:nvSpPr>
-        <p:spPr>
-          <a:xfrm>
-            <a:off x="838200" y="5311833"/>
-            <a:ext cx="11163943" cy="1049803"/>
-          </a:xfrm>
-          <a:prstGeom prst="rect">
-            <a:avLst/>
-          </a:prstGeom>
-        </p:spPr>
-        <p:txBody>
-          <a:bodyPr vert="horz" lIns="91440" tIns="45720" rIns="91440" bIns="45720" rtlCol="0">
-            <a:normAutofit fontScale="32500" lnSpcReduction="20000"/>
-          </a:bodyPr>
-          <a:lstStyle>
-            <a:lvl1pPr marL="228600" indent="-228600" algn="l" defTabSz="914400" rtl="0" eaLnBrk="1" latinLnBrk="0" hangingPunct="1">
-              <a:lnSpc>
-                <a:spcPct val="90000"/>
-              </a:lnSpc>
-              <a:spcBef>
-                <a:spcPts val="1000"/>
-              </a:spcBef>
-              <a:buFont typeface="Arial" panose="020B0604020202020204" pitchFamily="34" charset="0"/>
-              <a:buChar char="•"/>
-              <a:defRPr sz="2800" kern="1200">
-                <a:solidFill>
-                  <a:schemeClr val="tx1"/>
-                </a:solidFill>
-                <a:latin typeface="+mn-lt"/>
-                <a:ea typeface="+mn-ea"/>
-                <a:cs typeface="+mn-cs"/>
-              </a:defRPr>
-            </a:lvl1pPr>
-            <a:lvl2pPr marL="685800" indent="-228600" algn="l" defTabSz="914400" rtl="0" eaLnBrk="1" latinLnBrk="0" hangingPunct="1">
-              <a:lnSpc>
-                <a:spcPct val="90000"/>
-              </a:lnSpc>
-              <a:spcBef>
-                <a:spcPts val="500"/>
-              </a:spcBef>
-              <a:buFont typeface="Arial" panose="020B0604020202020204" pitchFamily="34" charset="0"/>
-              <a:buChar char="•"/>
-              <a:defRPr sz="2400" kern="1200">
-                <a:solidFill>
-                  <a:schemeClr val="tx1"/>
-                </a:solidFill>
-                <a:latin typeface="+mn-lt"/>
-                <a:ea typeface="+mn-ea"/>
-                <a:cs typeface="+mn-cs"/>
-              </a:defRPr>
-            </a:lvl2pPr>
-            <a:lvl3pPr marL="1143000" indent="-228600" algn="l" defTabSz="914400" rtl="0" eaLnBrk="1" latinLnBrk="0" hangingPunct="1">
-              <a:lnSpc>
-                <a:spcPct val="90000"/>
-              </a:lnSpc>
-              <a:spcBef>
-                <a:spcPts val="500"/>
-              </a:spcBef>
-              <a:buFont typeface="Arial" panose="020B0604020202020204" pitchFamily="34" charset="0"/>
-              <a:buChar char="•"/>
-              <a:defRPr sz="2000" kern="1200">
-                <a:solidFill>
-                  <a:schemeClr val="tx1"/>
-                </a:solidFill>
-                <a:latin typeface="+mn-lt"/>
-                <a:ea typeface="+mn-ea"/>
-                <a:cs typeface="+mn-cs"/>
-              </a:defRPr>
-            </a:lvl3pPr>
-            <a:lvl4pPr marL="1600200" indent="-228600" algn="l" defTabSz="914400" rtl="0" eaLnBrk="1" latinLnBrk="0" hangingPunct="1">
-              <a:lnSpc>
-                <a:spcPct val="90000"/>
-              </a:lnSpc>
-              <a:spcBef>
-                <a:spcPts val="500"/>
-              </a:spcBef>
-              <a:buFont typeface="Arial" panose="020B0604020202020204" pitchFamily="34" charset="0"/>
-              <a:buChar char="•"/>
-              <a:defRPr sz="1800" kern="1200">
-                <a:solidFill>
-                  <a:schemeClr val="tx1"/>
-                </a:solidFill>
-                <a:latin typeface="+mn-lt"/>
-                <a:ea typeface="+mn-ea"/>
-                <a:cs typeface="+mn-cs"/>
-              </a:defRPr>
-            </a:lvl4pPr>
-            <a:lvl5pPr marL="2057400" indent="-228600" algn="l" defTabSz="914400" rtl="0" eaLnBrk="1" latinLnBrk="0" hangingPunct="1">
-              <a:lnSpc>
-                <a:spcPct val="90000"/>
-              </a:lnSpc>
-              <a:spcBef>
-                <a:spcPts val="500"/>
-              </a:spcBef>
-              <a:buFont typeface="Arial" panose="020B0604020202020204" pitchFamily="34" charset="0"/>
-              <a:buChar char="•"/>
-              <a:defRPr sz="1800" kern="1200">
-                <a:solidFill>
-                  <a:schemeClr val="tx1"/>
-                </a:solidFill>
-                <a:latin typeface="+mn-lt"/>
-                <a:ea typeface="+mn-ea"/>
-                <a:cs typeface="+mn-cs"/>
-              </a:defRPr>
-            </a:lvl5pPr>
-            <a:lvl6pPr marL="2514600" indent="-228600" algn="l" defTabSz="914400" rtl="0" eaLnBrk="1" latinLnBrk="0" hangingPunct="1">
-              <a:lnSpc>
-                <a:spcPct val="90000"/>
-              </a:lnSpc>
-              <a:spcBef>
-                <a:spcPts val="500"/>
-              </a:spcBef>
-              <a:buFont typeface="Arial" panose="020B0604020202020204" pitchFamily="34" charset="0"/>
-              <a:buChar char="•"/>
-              <a:defRPr sz="1800" kern="1200">
-                <a:solidFill>
-                  <a:schemeClr val="tx1"/>
-                </a:solidFill>
-                <a:latin typeface="+mn-lt"/>
-                <a:ea typeface="+mn-ea"/>
-                <a:cs typeface="+mn-cs"/>
-              </a:defRPr>
-            </a:lvl6pPr>
-            <a:lvl7pPr marL="2971800" indent="-228600" algn="l" defTabSz="914400" rtl="0" eaLnBrk="1" latinLnBrk="0" hangingPunct="1">
-              <a:lnSpc>
-                <a:spcPct val="90000"/>
-              </a:lnSpc>
-              <a:spcBef>
-                <a:spcPts val="500"/>
-              </a:spcBef>
-              <a:buFont typeface="Arial" panose="020B0604020202020204" pitchFamily="34" charset="0"/>
-              <a:buChar char="•"/>
-              <a:defRPr sz="1800" kern="1200">
-                <a:solidFill>
-                  <a:schemeClr val="tx1"/>
-                </a:solidFill>
-                <a:latin typeface="+mn-lt"/>
-                <a:ea typeface="+mn-ea"/>
-                <a:cs typeface="+mn-cs"/>
-              </a:defRPr>
-            </a:lvl7pPr>
-            <a:lvl8pPr marL="3429000" indent="-228600" algn="l" defTabSz="914400" rtl="0" eaLnBrk="1" latinLnBrk="0" hangingPunct="1">
-              <a:lnSpc>
-                <a:spcPct val="90000"/>
-              </a:lnSpc>
-              <a:spcBef>
-                <a:spcPts val="500"/>
-              </a:spcBef>
-              <a:buFont typeface="Arial" panose="020B0604020202020204" pitchFamily="34" charset="0"/>
-              <a:buChar char="•"/>
-              <a:defRPr sz="1800" kern="1200">
-                <a:solidFill>
-                  <a:schemeClr val="tx1"/>
-                </a:solidFill>
-                <a:latin typeface="+mn-lt"/>
-                <a:ea typeface="+mn-ea"/>
-                <a:cs typeface="+mn-cs"/>
-              </a:defRPr>
-            </a:lvl8pPr>
-            <a:lvl9pPr marL="3886200" indent="-228600" algn="l" defTabSz="914400" rtl="0" eaLnBrk="1" latinLnBrk="0" hangingPunct="1">
-              <a:lnSpc>
-                <a:spcPct val="90000"/>
-              </a:lnSpc>
-              <a:spcBef>
-                <a:spcPts val="500"/>
-              </a:spcBef>
-              <a:buFont typeface="Arial" panose="020B0604020202020204" pitchFamily="34" charset="0"/>
-              <a:buChar char="•"/>
-              <a:defRPr sz="1800" kern="1200">
-                <a:solidFill>
-                  <a:schemeClr val="tx1"/>
-                </a:solidFill>
-                <a:latin typeface="+mn-lt"/>
-                <a:ea typeface="+mn-ea"/>
-                <a:cs typeface="+mn-cs"/>
-              </a:defRPr>
-            </a:lvl9pPr>
-          </a:lstStyle>
-          <a:p>
-            <a:pPr marL="0" indent="0" algn="r">
-              <a:spcBef>
-                <a:spcPts val="300"/>
-              </a:spcBef>
-              <a:buNone/>
-            </a:pPr>
-            <a:r>
-              <a:rPr lang="de-CH" sz="3800" dirty="0">
-                <a:latin typeface="+mj-lt"/>
-              </a:rPr>
-              <a:t>thomas.graf@swisscom.com</a:t>
-            </a:r>
-          </a:p>
-          <a:p>
-            <a:pPr marL="0" indent="0" algn="r">
-              <a:spcBef>
-                <a:spcPts val="300"/>
-              </a:spcBef>
-              <a:buNone/>
-            </a:pPr>
-            <a:r>
-              <a:rPr lang="de-CH" sz="3800" dirty="0">
-                <a:latin typeface="+mj-lt"/>
-              </a:rPr>
-              <a:t>alex.huang-feng@insa-lyon.fr</a:t>
-            </a:r>
-            <a:br>
-              <a:rPr lang="de-CH" sz="3800" dirty="0">
-                <a:latin typeface="+mj-lt"/>
-              </a:rPr>
-            </a:br>
-            <a:r>
-              <a:rPr lang="de-CH" sz="3800" dirty="0">
-                <a:latin typeface="+mj-lt"/>
-              </a:rPr>
-              <a:t>bill.wu@huawei.com</a:t>
-            </a:r>
-          </a:p>
-          <a:p>
-            <a:pPr marL="0" indent="0" algn="r">
-              <a:spcBef>
-                <a:spcPts val="300"/>
-              </a:spcBef>
-              <a:buNone/>
-            </a:pPr>
-            <a:r>
-              <a:rPr lang="de-CH" sz="3800" dirty="0">
-                <a:latin typeface="+mj-lt"/>
-              </a:rPr>
-              <a:t>maqiufang1@huawei.com</a:t>
-            </a:r>
-          </a:p>
-          <a:p>
-            <a:pPr marL="0" indent="0" algn="r">
-              <a:spcBef>
-                <a:spcPts val="300"/>
-              </a:spcBef>
-              <a:buNone/>
-            </a:pPr>
-            <a:endParaRPr lang="de-CH" sz="3800" dirty="0">
-              <a:latin typeface="+mj-lt"/>
-            </a:endParaRPr>
-          </a:p>
-          <a:p>
-            <a:pPr marL="0" indent="0" algn="r">
-              <a:spcBef>
-                <a:spcPts val="300"/>
-              </a:spcBef>
-              <a:buNone/>
-            </a:pPr>
-            <a:r>
-              <a:rPr lang="de-CH" sz="3800" dirty="0">
-                <a:latin typeface="+mj-lt"/>
-              </a:rPr>
-              <a:t>2. </a:t>
+              <a:t>6. </a:t>
             </a:r>
             <a:r>
               <a:rPr lang="de-CH" sz="3800" dirty="0" err="1">
@@ -8846,7 +8772,7 @@
 </p:sld>
 </file>
 
-<file path=ppt/slides/slide6.xml><?xml version="1.0" encoding="utf-8"?>
+<file path=ppt/slides/slide7.xml><?xml version="1.0" encoding="utf-8"?>
 <p:sld xmlns:a="http://schemas.openxmlformats.org/drawingml/2006/main" xmlns:r="http://schemas.openxmlformats.org/officeDocument/2006/relationships" xmlns:p="http://schemas.openxmlformats.org/presentationml/2006/main">
   <p:cSld>
     <p:spTree>
@@ -8906,393 +8832,6 @@
         </p:txBody>
       </p:sp>
     </p:spTree>
-  </p:cSld>
-  <p:clrMapOvr>
-    <a:masterClrMapping/>
-  </p:clrMapOvr>
-</p:sld>
-</file>
-
-<file path=ppt/slides/slide7.xml><?xml version="1.0" encoding="utf-8"?>
-<p:sld xmlns:a="http://schemas.openxmlformats.org/drawingml/2006/main" xmlns:r="http://schemas.openxmlformats.org/officeDocument/2006/relationships" xmlns:p="http://schemas.openxmlformats.org/presentationml/2006/main">
-  <p:cSld>
-    <p:spTree>
-      <p:nvGrpSpPr>
-        <p:cNvPr id="1" name=""/>
-        <p:cNvGrpSpPr/>
-        <p:nvPr/>
-      </p:nvGrpSpPr>
-      <p:grpSpPr>
-        <a:xfrm>
-          <a:off x="0" y="0"/>
-          <a:ext cx="0" cy="0"/>
-          <a:chOff x="0" y="0"/>
-          <a:chExt cx="0" cy="0"/>
-        </a:xfrm>
-      </p:grpSpPr>
-      <p:sp>
-        <p:nvSpPr>
-          <p:cNvPr id="2" name="Title 1">
-            <a:extLst>
-              <a:ext uri="{FF2B5EF4-FFF2-40B4-BE49-F238E27FC236}">
-                <a16:creationId xmlns:a16="http://schemas.microsoft.com/office/drawing/2014/main" id="{FF20F271-6F0D-4AC0-BB1D-F5C338165C13}"/>
-              </a:ext>
-            </a:extLst>
-          </p:cNvPr>
-          <p:cNvSpPr>
-            <a:spLocks noGrp="1"/>
-          </p:cNvSpPr>
-          <p:nvPr>
-            <p:ph type="title"/>
-          </p:nvPr>
-        </p:nvSpPr>
-        <p:spPr/>
-        <p:txBody>
-          <a:bodyPr>
-            <a:normAutofit/>
-          </a:bodyPr>
-          <a:lstStyle/>
-          <a:p>
-            <a:r>
-              <a:rPr lang="en-US" sz="2800" b="1" dirty="0"/>
-              <a:t>YANG Notification </a:t>
-            </a:r>
-            <a:r>
-              <a:rPr lang="en-US" sz="2800" b="1" dirty="0">
-                <a:solidFill>
-                  <a:srgbClr val="FF0000"/>
-                </a:solidFill>
-              </a:rPr>
-              <a:t>Transport Capabilities</a:t>
-            </a:r>
-            <a:br>
-              <a:rPr lang="en-US" sz="2800" b="1" dirty="0"/>
-            </a:br>
-            <a:r>
-              <a:rPr lang="en-US" sz="2400" b="1" dirty="0" err="1">
-                <a:solidFill>
-                  <a:schemeClr val="bg2">
-                    <a:lumMod val="75000"/>
-                  </a:schemeClr>
-                </a:solidFill>
-              </a:rPr>
-              <a:t>Capabilities</a:t>
-            </a:r>
-            <a:r>
-              <a:rPr lang="en-US" sz="2400" b="1" dirty="0">
-                <a:solidFill>
-                  <a:schemeClr val="bg2">
-                    <a:lumMod val="75000"/>
-                  </a:schemeClr>
-                </a:solidFill>
-              </a:rPr>
-              <a:t> for Systems and Datastore Update Notifications</a:t>
-            </a:r>
-            <a:br>
-              <a:rPr lang="en-US" sz="1050" b="1" dirty="0"/>
-            </a:br>
-            <a:endParaRPr lang="en-US" sz="2400" dirty="0">
-              <a:solidFill>
-                <a:schemeClr val="bg2">
-                  <a:lumMod val="75000"/>
-                </a:schemeClr>
-              </a:solidFill>
-            </a:endParaRPr>
-          </a:p>
-        </p:txBody>
-      </p:sp>
-      <p:sp>
-        <p:nvSpPr>
-          <p:cNvPr id="3" name="Content Placeholder 2">
-            <a:extLst>
-              <a:ext uri="{FF2B5EF4-FFF2-40B4-BE49-F238E27FC236}">
-                <a16:creationId xmlns:a16="http://schemas.microsoft.com/office/drawing/2014/main" id="{29C0DFD4-432D-4B0C-93DF-790441DCF5B9}"/>
-              </a:ext>
-            </a:extLst>
-          </p:cNvPr>
-          <p:cNvSpPr>
-            <a:spLocks noGrp="1"/>
-          </p:cNvSpPr>
-          <p:nvPr>
-            <p:ph idx="1"/>
-          </p:nvPr>
-        </p:nvSpPr>
-        <p:spPr>
-          <a:xfrm>
-            <a:off x="838201" y="1950098"/>
-            <a:ext cx="10846526" cy="4417453"/>
-          </a:xfrm>
-        </p:spPr>
-        <p:txBody>
-          <a:bodyPr>
-            <a:noAutofit/>
-          </a:bodyPr>
-          <a:lstStyle/>
-          <a:p>
-            <a:r>
-              <a:rPr lang="en-US" sz="1700" dirty="0">
-                <a:hlinkClick r:id="rId2"/>
-              </a:rPr>
-              <a:t>Section 7 of RFC 8639 </a:t>
-            </a:r>
-            <a:r>
-              <a:rPr lang="en-US" sz="1700" dirty="0"/>
-              <a:t>and </a:t>
-            </a:r>
-            <a:r>
-              <a:rPr lang="en-US" sz="1700" dirty="0">
-                <a:hlinkClick r:id="rId3"/>
-              </a:rPr>
-              <a:t>errata 6211 </a:t>
-            </a:r>
-            <a:r>
-              <a:rPr lang="en-US" sz="1700" dirty="0"/>
-              <a:t>describes that that supported YANG-Push transport encodings needs to be discoverable.</a:t>
-            </a:r>
-          </a:p>
-          <a:p>
-            <a:r>
-              <a:rPr lang="en-US" sz="1700" dirty="0">
-                <a:hlinkClick r:id="rId4"/>
-              </a:rPr>
-              <a:t>Section 2.5 of RFC 8639 </a:t>
-            </a:r>
-            <a:r>
-              <a:rPr lang="en-US" sz="1700" dirty="0"/>
-              <a:t>describes configured YANG-Push subscriptions. </a:t>
-            </a:r>
-            <a:r>
-              <a:rPr lang="en-US" sz="1700" dirty="0">
-                <a:hlinkClick r:id="rId5"/>
-              </a:rPr>
-              <a:t>draft-</a:t>
-            </a:r>
-            <a:r>
-              <a:rPr lang="en-US" sz="1700" dirty="0" err="1">
-                <a:hlinkClick r:id="rId5"/>
-              </a:rPr>
-              <a:t>ietf</a:t>
-            </a:r>
-            <a:r>
-              <a:rPr lang="en-US" sz="1700" dirty="0">
-                <a:hlinkClick r:id="rId5"/>
-              </a:rPr>
-              <a:t>-netconf-</a:t>
-            </a:r>
-            <a:r>
-              <a:rPr lang="en-US" sz="1700" dirty="0" err="1">
-                <a:hlinkClick r:id="rId5"/>
-              </a:rPr>
-              <a:t>udp</a:t>
-            </a:r>
-            <a:r>
-              <a:rPr lang="en-US" sz="1700" dirty="0">
-                <a:hlinkClick r:id="rId5"/>
-              </a:rPr>
-              <a:t>-</a:t>
-            </a:r>
-            <a:r>
-              <a:rPr lang="en-US" sz="1700" dirty="0" err="1">
-                <a:hlinkClick r:id="rId5"/>
-              </a:rPr>
-              <a:t>notif</a:t>
-            </a:r>
-            <a:r>
-              <a:rPr lang="en-US" sz="1700" dirty="0"/>
-              <a:t> and </a:t>
-            </a:r>
-            <a:r>
-              <a:rPr lang="en-US" sz="1700" dirty="0">
-                <a:hlinkClick r:id="rId6"/>
-              </a:rPr>
-              <a:t>draft-</a:t>
-            </a:r>
-            <a:r>
-              <a:rPr lang="en-US" sz="1700" dirty="0" err="1">
-                <a:hlinkClick r:id="rId6"/>
-              </a:rPr>
-              <a:t>ietf</a:t>
-            </a:r>
-            <a:r>
-              <a:rPr lang="en-US" sz="1700" dirty="0">
-                <a:hlinkClick r:id="rId6"/>
-              </a:rPr>
-              <a:t>-netconf-https-</a:t>
-            </a:r>
-            <a:r>
-              <a:rPr lang="en-US" sz="1700" dirty="0" err="1">
-                <a:hlinkClick r:id="rId6"/>
-              </a:rPr>
-              <a:t>notif</a:t>
-            </a:r>
-            <a:r>
-              <a:rPr lang="en-US" sz="1700" dirty="0"/>
-              <a:t> are two transport protocols for configured YANG-Push subscriptions.</a:t>
-            </a:r>
-          </a:p>
-          <a:p>
-            <a:r>
-              <a:rPr lang="en-US" sz="1700" dirty="0">
-                <a:hlinkClick r:id="rId7"/>
-              </a:rPr>
-              <a:t>RFC 9196 </a:t>
-            </a:r>
-            <a:r>
-              <a:rPr lang="en-US" sz="1700" dirty="0"/>
-              <a:t>defines two YANG modules, "</a:t>
-            </a:r>
-            <a:r>
-              <a:rPr lang="en-US" sz="1700" dirty="0" err="1"/>
-              <a:t>ietf</a:t>
-            </a:r>
-            <a:r>
-              <a:rPr lang="en-US" sz="1700" dirty="0"/>
-              <a:t>-system-capabilities" and "</a:t>
-            </a:r>
-            <a:r>
-              <a:rPr lang="en-US" sz="1700" dirty="0" err="1"/>
-              <a:t>ietf</a:t>
-            </a:r>
-            <a:r>
-              <a:rPr lang="en-US" sz="1700" dirty="0"/>
-              <a:t>-notification-capabilities". </a:t>
-            </a:r>
-          </a:p>
-          <a:p>
-            <a:r>
-              <a:rPr lang="en-US" sz="1700" dirty="0"/>
-              <a:t>The module "</a:t>
-            </a:r>
-            <a:r>
-              <a:rPr lang="en-US" sz="1700" dirty="0" err="1"/>
-              <a:t>ietf</a:t>
-            </a:r>
-            <a:r>
-              <a:rPr lang="en-US" sz="1700" dirty="0"/>
-              <a:t>-system-capabilities" provides a placeholder structure that can be used to discover YANG-related system capabilities for servers. </a:t>
-            </a:r>
-          </a:p>
-          <a:p>
-            <a:r>
-              <a:rPr lang="en-US" sz="1700" dirty="0"/>
-              <a:t>The module "</a:t>
-            </a:r>
-            <a:r>
-              <a:rPr lang="en-US" sz="1700" dirty="0" err="1"/>
-              <a:t>ietf</a:t>
-            </a:r>
-            <a:r>
-              <a:rPr lang="en-US" sz="1700" dirty="0"/>
-              <a:t>-notification-capabilities" augments "</a:t>
-            </a:r>
-            <a:r>
-              <a:rPr lang="en-US" sz="1700" dirty="0" err="1"/>
-              <a:t>ietf</a:t>
-            </a:r>
-            <a:r>
-              <a:rPr lang="en-US" sz="1700" dirty="0"/>
-              <a:t>-system-capabilities" to specify notification capabilities related to </a:t>
-            </a:r>
-            <a:r>
-              <a:rPr lang="en-US" sz="1700" dirty="0">
-                <a:hlinkClick r:id="rId8"/>
-              </a:rPr>
-              <a:t>RFC 8641</a:t>
-            </a:r>
-            <a:r>
-              <a:rPr lang="en-US" sz="1700" dirty="0"/>
-              <a:t>.</a:t>
-            </a:r>
-          </a:p>
-          <a:p>
-            <a:r>
-              <a:rPr lang="en-US" sz="1700" dirty="0">
-                <a:hlinkClick r:id="rId9"/>
-              </a:rPr>
-              <a:t>Section 3 of RFC 9196 </a:t>
-            </a:r>
-            <a:r>
-              <a:rPr lang="en-US" sz="1700" dirty="0"/>
-              <a:t>defines the following transport agnostic notification capabilities</a:t>
-            </a:r>
-          </a:p>
-          <a:p>
-            <a:pPr lvl="1"/>
-            <a:r>
-              <a:rPr lang="en-US" sz="1700" dirty="0"/>
-              <a:t>supported (reporting) periods for "periodic" subscriptions.</a:t>
-            </a:r>
-          </a:p>
-          <a:p>
-            <a:pPr lvl="1"/>
-            <a:r>
-              <a:rPr lang="en-US" sz="1700" dirty="0"/>
-              <a:t>the maximum number of objects that can be sent in an update.</a:t>
-            </a:r>
-          </a:p>
-          <a:p>
-            <a:pPr lvl="1"/>
-            <a:r>
-              <a:rPr lang="en-US" sz="1700" dirty="0"/>
-              <a:t>the set of datastores or data nodes for which "periodic" notification is supported.</a:t>
-            </a:r>
-          </a:p>
-          <a:p>
-            <a:pPr lvl="1"/>
-            <a:r>
-              <a:rPr lang="en-US" sz="1700" dirty="0"/>
-              <a:t>supported dampening periods for "on-change" subscriptions.</a:t>
-            </a:r>
-          </a:p>
-          <a:p>
-            <a:pPr lvl="1"/>
-            <a:r>
-              <a:rPr lang="en-US" sz="1700" dirty="0"/>
-              <a:t>the set of datastores or data nodes for which "on-change" notification is supported.</a:t>
-            </a:r>
-          </a:p>
-        </p:txBody>
-      </p:sp>
-      <p:sp>
-        <p:nvSpPr>
-          <p:cNvPr id="7" name="Slide Number Placeholder 1">
-            <a:extLst>
-              <a:ext uri="{FF2B5EF4-FFF2-40B4-BE49-F238E27FC236}">
-                <a16:creationId xmlns:a16="http://schemas.microsoft.com/office/drawing/2014/main" id="{7735C87E-721C-4A3D-8B4A-DFBB832FF94D}"/>
-              </a:ext>
-            </a:extLst>
-          </p:cNvPr>
-          <p:cNvSpPr>
-            <a:spLocks noGrp="1"/>
-          </p:cNvSpPr>
-          <p:nvPr>
-            <p:ph type="sldNum" sz="quarter" idx="12"/>
-          </p:nvPr>
-        </p:nvSpPr>
-        <p:spPr>
-          <a:xfrm>
-            <a:off x="11587892" y="6361637"/>
-            <a:ext cx="414251" cy="365125"/>
-          </a:xfrm>
-        </p:spPr>
-        <p:txBody>
-          <a:bodyPr/>
-          <a:lstStyle/>
-          <a:p>
-            <a:fld id="{FC4AC485-25DE-431E-B345-9C0A15BB7F8A}" type="slidenum">
-              <a:rPr lang="de-CH" sz="1400" smtClean="0"/>
-              <a:t>7</a:t>
-            </a:fld>
-            <a:endParaRPr lang="de-CH" sz="1400" dirty="0"/>
-          </a:p>
-        </p:txBody>
-      </p:sp>
-    </p:spTree>
-    <p:extLst>
-      <p:ext uri="{BB962C8B-B14F-4D97-AF65-F5344CB8AC3E}">
-        <p14:creationId xmlns:p14="http://schemas.microsoft.com/office/powerpoint/2010/main" val="2701002203"/>
-      </p:ext>
-    </p:extLst>
   </p:cSld>
   <p:clrMapOvr>
     <a:masterClrMapping/>
@@ -9356,6 +8895,393 @@
               <a:rPr lang="en-US" sz="2800" b="1" dirty="0"/>
             </a:br>
             <a:r>
+              <a:rPr lang="en-US" sz="2400" b="1" dirty="0" err="1">
+                <a:solidFill>
+                  <a:schemeClr val="bg2">
+                    <a:lumMod val="75000"/>
+                  </a:schemeClr>
+                </a:solidFill>
+              </a:rPr>
+              <a:t>Capabilities</a:t>
+            </a:r>
+            <a:r>
+              <a:rPr lang="en-US" sz="2400" b="1" dirty="0">
+                <a:solidFill>
+                  <a:schemeClr val="bg2">
+                    <a:lumMod val="75000"/>
+                  </a:schemeClr>
+                </a:solidFill>
+              </a:rPr>
+              <a:t> for Systems and Datastore Update Notifications</a:t>
+            </a:r>
+            <a:br>
+              <a:rPr lang="en-US" sz="1050" b="1" dirty="0"/>
+            </a:br>
+            <a:endParaRPr lang="en-US" sz="2400" dirty="0">
+              <a:solidFill>
+                <a:schemeClr val="bg2">
+                  <a:lumMod val="75000"/>
+                </a:schemeClr>
+              </a:solidFill>
+            </a:endParaRPr>
+          </a:p>
+        </p:txBody>
+      </p:sp>
+      <p:sp>
+        <p:nvSpPr>
+          <p:cNvPr id="3" name="Content Placeholder 2">
+            <a:extLst>
+              <a:ext uri="{FF2B5EF4-FFF2-40B4-BE49-F238E27FC236}">
+                <a16:creationId xmlns:a16="http://schemas.microsoft.com/office/drawing/2014/main" id="{29C0DFD4-432D-4B0C-93DF-790441DCF5B9}"/>
+              </a:ext>
+            </a:extLst>
+          </p:cNvPr>
+          <p:cNvSpPr>
+            <a:spLocks noGrp="1"/>
+          </p:cNvSpPr>
+          <p:nvPr>
+            <p:ph idx="1"/>
+          </p:nvPr>
+        </p:nvSpPr>
+        <p:spPr>
+          <a:xfrm>
+            <a:off x="838201" y="1950098"/>
+            <a:ext cx="10846526" cy="4417453"/>
+          </a:xfrm>
+        </p:spPr>
+        <p:txBody>
+          <a:bodyPr>
+            <a:noAutofit/>
+          </a:bodyPr>
+          <a:lstStyle/>
+          <a:p>
+            <a:r>
+              <a:rPr lang="en-US" sz="1700" dirty="0">
+                <a:hlinkClick r:id="rId2"/>
+              </a:rPr>
+              <a:t>Section 7 of RFC 8639 </a:t>
+            </a:r>
+            <a:r>
+              <a:rPr lang="en-US" sz="1700" dirty="0"/>
+              <a:t>and </a:t>
+            </a:r>
+            <a:r>
+              <a:rPr lang="en-US" sz="1700" dirty="0">
+                <a:hlinkClick r:id="rId3"/>
+              </a:rPr>
+              <a:t>errata 6211 </a:t>
+            </a:r>
+            <a:r>
+              <a:rPr lang="en-US" sz="1700" dirty="0"/>
+              <a:t>describes that that supported YANG-Push transport encodings needs to be discoverable.</a:t>
+            </a:r>
+          </a:p>
+          <a:p>
+            <a:r>
+              <a:rPr lang="en-US" sz="1700" dirty="0">
+                <a:hlinkClick r:id="rId4"/>
+              </a:rPr>
+              <a:t>Section 2.5 of RFC 8639 </a:t>
+            </a:r>
+            <a:r>
+              <a:rPr lang="en-US" sz="1700" dirty="0"/>
+              <a:t>describes configured YANG-Push subscriptions. </a:t>
+            </a:r>
+            <a:r>
+              <a:rPr lang="en-US" sz="1700" dirty="0">
+                <a:hlinkClick r:id="rId5"/>
+              </a:rPr>
+              <a:t>draft-</a:t>
+            </a:r>
+            <a:r>
+              <a:rPr lang="en-US" sz="1700" dirty="0" err="1">
+                <a:hlinkClick r:id="rId5"/>
+              </a:rPr>
+              <a:t>ietf</a:t>
+            </a:r>
+            <a:r>
+              <a:rPr lang="en-US" sz="1700" dirty="0">
+                <a:hlinkClick r:id="rId5"/>
+              </a:rPr>
+              <a:t>-netconf-</a:t>
+            </a:r>
+            <a:r>
+              <a:rPr lang="en-US" sz="1700" dirty="0" err="1">
+                <a:hlinkClick r:id="rId5"/>
+              </a:rPr>
+              <a:t>udp</a:t>
+            </a:r>
+            <a:r>
+              <a:rPr lang="en-US" sz="1700" dirty="0">
+                <a:hlinkClick r:id="rId5"/>
+              </a:rPr>
+              <a:t>-</a:t>
+            </a:r>
+            <a:r>
+              <a:rPr lang="en-US" sz="1700" dirty="0" err="1">
+                <a:hlinkClick r:id="rId5"/>
+              </a:rPr>
+              <a:t>notif</a:t>
+            </a:r>
+            <a:r>
+              <a:rPr lang="en-US" sz="1700" dirty="0"/>
+              <a:t> and </a:t>
+            </a:r>
+            <a:r>
+              <a:rPr lang="en-US" sz="1700" dirty="0">
+                <a:hlinkClick r:id="rId6"/>
+              </a:rPr>
+              <a:t>draft-</a:t>
+            </a:r>
+            <a:r>
+              <a:rPr lang="en-US" sz="1700" dirty="0" err="1">
+                <a:hlinkClick r:id="rId6"/>
+              </a:rPr>
+              <a:t>ietf</a:t>
+            </a:r>
+            <a:r>
+              <a:rPr lang="en-US" sz="1700" dirty="0">
+                <a:hlinkClick r:id="rId6"/>
+              </a:rPr>
+              <a:t>-netconf-https-</a:t>
+            </a:r>
+            <a:r>
+              <a:rPr lang="en-US" sz="1700" dirty="0" err="1">
+                <a:hlinkClick r:id="rId6"/>
+              </a:rPr>
+              <a:t>notif</a:t>
+            </a:r>
+            <a:r>
+              <a:rPr lang="en-US" sz="1700" dirty="0"/>
+              <a:t> are two transport protocols for configured YANG-Push subscriptions.</a:t>
+            </a:r>
+          </a:p>
+          <a:p>
+            <a:r>
+              <a:rPr lang="en-US" sz="1700" dirty="0">
+                <a:hlinkClick r:id="rId7"/>
+              </a:rPr>
+              <a:t>RFC 9196 </a:t>
+            </a:r>
+            <a:r>
+              <a:rPr lang="en-US" sz="1700" dirty="0"/>
+              <a:t>defines two YANG modules, "</a:t>
+            </a:r>
+            <a:r>
+              <a:rPr lang="en-US" sz="1700" dirty="0" err="1"/>
+              <a:t>ietf</a:t>
+            </a:r>
+            <a:r>
+              <a:rPr lang="en-US" sz="1700" dirty="0"/>
+              <a:t>-system-capabilities" and "</a:t>
+            </a:r>
+            <a:r>
+              <a:rPr lang="en-US" sz="1700" dirty="0" err="1"/>
+              <a:t>ietf</a:t>
+            </a:r>
+            <a:r>
+              <a:rPr lang="en-US" sz="1700" dirty="0"/>
+              <a:t>-notification-capabilities". </a:t>
+            </a:r>
+          </a:p>
+          <a:p>
+            <a:r>
+              <a:rPr lang="en-US" sz="1700" dirty="0"/>
+              <a:t>The module "</a:t>
+            </a:r>
+            <a:r>
+              <a:rPr lang="en-US" sz="1700" dirty="0" err="1"/>
+              <a:t>ietf</a:t>
+            </a:r>
+            <a:r>
+              <a:rPr lang="en-US" sz="1700" dirty="0"/>
+              <a:t>-system-capabilities" provides a placeholder structure that can be used to discover YANG-related system capabilities for servers. </a:t>
+            </a:r>
+          </a:p>
+          <a:p>
+            <a:r>
+              <a:rPr lang="en-US" sz="1700" dirty="0"/>
+              <a:t>The module "</a:t>
+            </a:r>
+            <a:r>
+              <a:rPr lang="en-US" sz="1700" dirty="0" err="1"/>
+              <a:t>ietf</a:t>
+            </a:r>
+            <a:r>
+              <a:rPr lang="en-US" sz="1700" dirty="0"/>
+              <a:t>-notification-capabilities" augments "</a:t>
+            </a:r>
+            <a:r>
+              <a:rPr lang="en-US" sz="1700" dirty="0" err="1"/>
+              <a:t>ietf</a:t>
+            </a:r>
+            <a:r>
+              <a:rPr lang="en-US" sz="1700" dirty="0"/>
+              <a:t>-system-capabilities" to specify notification capabilities related to </a:t>
+            </a:r>
+            <a:r>
+              <a:rPr lang="en-US" sz="1700" dirty="0">
+                <a:hlinkClick r:id="rId8"/>
+              </a:rPr>
+              <a:t>RFC 8641</a:t>
+            </a:r>
+            <a:r>
+              <a:rPr lang="en-US" sz="1700" dirty="0"/>
+              <a:t>.</a:t>
+            </a:r>
+          </a:p>
+          <a:p>
+            <a:r>
+              <a:rPr lang="en-US" sz="1700" dirty="0">
+                <a:hlinkClick r:id="rId9"/>
+              </a:rPr>
+              <a:t>Section 3 of RFC 9196 </a:t>
+            </a:r>
+            <a:r>
+              <a:rPr lang="en-US" sz="1700" dirty="0"/>
+              <a:t>defines the following transport agnostic notification capabilities</a:t>
+            </a:r>
+          </a:p>
+          <a:p>
+            <a:pPr lvl="1"/>
+            <a:r>
+              <a:rPr lang="en-US" sz="1700" dirty="0"/>
+              <a:t>supported (reporting) periods for "periodic" subscriptions.</a:t>
+            </a:r>
+          </a:p>
+          <a:p>
+            <a:pPr lvl="1"/>
+            <a:r>
+              <a:rPr lang="en-US" sz="1700" dirty="0"/>
+              <a:t>the maximum number of objects that can be sent in an update.</a:t>
+            </a:r>
+          </a:p>
+          <a:p>
+            <a:pPr lvl="1"/>
+            <a:r>
+              <a:rPr lang="en-US" sz="1700" dirty="0"/>
+              <a:t>the set of datastores or data nodes for which "periodic" notification is supported.</a:t>
+            </a:r>
+          </a:p>
+          <a:p>
+            <a:pPr lvl="1"/>
+            <a:r>
+              <a:rPr lang="en-US" sz="1700" dirty="0"/>
+              <a:t>supported dampening periods for "on-change" subscriptions.</a:t>
+            </a:r>
+          </a:p>
+          <a:p>
+            <a:pPr lvl="1"/>
+            <a:r>
+              <a:rPr lang="en-US" sz="1700" dirty="0"/>
+              <a:t>the set of datastores or data nodes for which "on-change" notification is supported.</a:t>
+            </a:r>
+          </a:p>
+        </p:txBody>
+      </p:sp>
+      <p:sp>
+        <p:nvSpPr>
+          <p:cNvPr id="7" name="Slide Number Placeholder 1">
+            <a:extLst>
+              <a:ext uri="{FF2B5EF4-FFF2-40B4-BE49-F238E27FC236}">
+                <a16:creationId xmlns:a16="http://schemas.microsoft.com/office/drawing/2014/main" id="{7735C87E-721C-4A3D-8B4A-DFBB832FF94D}"/>
+              </a:ext>
+            </a:extLst>
+          </p:cNvPr>
+          <p:cNvSpPr>
+            <a:spLocks noGrp="1"/>
+          </p:cNvSpPr>
+          <p:nvPr>
+            <p:ph type="sldNum" sz="quarter" idx="12"/>
+          </p:nvPr>
+        </p:nvSpPr>
+        <p:spPr>
+          <a:xfrm>
+            <a:off x="11587892" y="6361637"/>
+            <a:ext cx="414251" cy="365125"/>
+          </a:xfrm>
+        </p:spPr>
+        <p:txBody>
+          <a:bodyPr/>
+          <a:lstStyle/>
+          <a:p>
+            <a:fld id="{FC4AC485-25DE-431E-B345-9C0A15BB7F8A}" type="slidenum">
+              <a:rPr lang="de-CH" sz="1400" smtClean="0"/>
+              <a:t>8</a:t>
+            </a:fld>
+            <a:endParaRPr lang="de-CH" sz="1400" dirty="0"/>
+          </a:p>
+        </p:txBody>
+      </p:sp>
+    </p:spTree>
+    <p:extLst>
+      <p:ext uri="{BB962C8B-B14F-4D97-AF65-F5344CB8AC3E}">
+        <p14:creationId xmlns:p14="http://schemas.microsoft.com/office/powerpoint/2010/main" val="2701002203"/>
+      </p:ext>
+    </p:extLst>
+  </p:cSld>
+  <p:clrMapOvr>
+    <a:masterClrMapping/>
+  </p:clrMapOvr>
+</p:sld>
+</file>
+
+<file path=ppt/slides/slide9.xml><?xml version="1.0" encoding="utf-8"?>
+<p:sld xmlns:a="http://schemas.openxmlformats.org/drawingml/2006/main" xmlns:r="http://schemas.openxmlformats.org/officeDocument/2006/relationships" xmlns:p="http://schemas.openxmlformats.org/presentationml/2006/main">
+  <p:cSld>
+    <p:spTree>
+      <p:nvGrpSpPr>
+        <p:cNvPr id="1" name=""/>
+        <p:cNvGrpSpPr/>
+        <p:nvPr/>
+      </p:nvGrpSpPr>
+      <p:grpSpPr>
+        <a:xfrm>
+          <a:off x="0" y="0"/>
+          <a:ext cx="0" cy="0"/>
+          <a:chOff x="0" y="0"/>
+          <a:chExt cx="0" cy="0"/>
+        </a:xfrm>
+      </p:grpSpPr>
+      <p:sp>
+        <p:nvSpPr>
+          <p:cNvPr id="2" name="Title 1">
+            <a:extLst>
+              <a:ext uri="{FF2B5EF4-FFF2-40B4-BE49-F238E27FC236}">
+                <a16:creationId xmlns:a16="http://schemas.microsoft.com/office/drawing/2014/main" id="{FF20F271-6F0D-4AC0-BB1D-F5C338165C13}"/>
+              </a:ext>
+            </a:extLst>
+          </p:cNvPr>
+          <p:cNvSpPr>
+            <a:spLocks noGrp="1"/>
+          </p:cNvSpPr>
+          <p:nvPr>
+            <p:ph type="title"/>
+          </p:nvPr>
+        </p:nvSpPr>
+        <p:spPr/>
+        <p:txBody>
+          <a:bodyPr>
+            <a:normAutofit/>
+          </a:bodyPr>
+          <a:lstStyle/>
+          <a:p>
+            <a:r>
+              <a:rPr lang="en-US" sz="2800" b="1" dirty="0"/>
+              <a:t>YANG Notification </a:t>
+            </a:r>
+            <a:r>
+              <a:rPr lang="en-US" sz="2800" b="1" dirty="0">
+                <a:solidFill>
+                  <a:srgbClr val="FF0000"/>
+                </a:solidFill>
+              </a:rPr>
+              <a:t>Transport Capabilities</a:t>
+            </a:r>
+            <a:br>
+              <a:rPr lang="en-US" sz="2800" b="1" dirty="0"/>
+            </a:br>
+            <a:r>
               <a:rPr lang="en-US" sz="2400" b="1" dirty="0">
                 <a:solidFill>
                   <a:schemeClr val="bg2">
@@ -9611,7 +9537,7 @@
           <a:p>
             <a:fld id="{FC4AC485-25DE-431E-B345-9C0A15BB7F8A}" type="slidenum">
               <a:rPr lang="de-CH" sz="1400" smtClean="0"/>
-              <a:t>8</a:t>
+              <a:t>9</a:t>
             </a:fld>
             <a:endParaRPr lang="de-CH" sz="1400" dirty="0"/>
           </a:p>

</xml_diff>